<commit_message>
include Settlement into milestone ppt
</commit_message>
<xml_diff>
--- a/documentation/Milestone Presentation.pptx
+++ b/documentation/Milestone Presentation.pptx
@@ -5,7 +5,7 @@
     <p:sldMasterId id="2147483660" r:id="rId1"/>
   </p:sldMasterIdLst>
   <p:notesMasterIdLst>
-    <p:notesMasterId r:id="rId9"/>
+    <p:notesMasterId r:id="rId10"/>
   </p:notesMasterIdLst>
   <p:sldIdLst>
     <p:sldId id="256" r:id="rId2"/>
@@ -15,6 +15,7 @@
     <p:sldId id="260" r:id="rId6"/>
     <p:sldId id="263" r:id="rId7"/>
     <p:sldId id="264" r:id="rId8"/>
+    <p:sldId id="265" r:id="rId9"/>
   </p:sldIdLst>
   <p:sldSz cx="9144000" cy="5143500" type="screen16x9"/>
   <p:notesSz cx="6858000" cy="9144000"/>
@@ -2000,6 +2001,67 @@
     <p:extLst>
       <p:ext uri="{BB962C8B-B14F-4D97-AF65-F5344CB8AC3E}">
         <p14:creationId xmlns:p14="http://schemas.microsoft.com/office/powerpoint/2010/main" val="1641863781"/>
+      </p:ext>
+    </p:extLst>
+  </p:cSld>
+  <p:clrMapOvr>
+    <a:masterClrMapping/>
+  </p:clrMapOvr>
+</p:notes>
+</file>
+
+<file path=ppt/notesSlides/notesSlide8.xml><?xml version="1.0" encoding="utf-8"?>
+<p:notes xmlns:a="http://schemas.openxmlformats.org/drawingml/2006/main" xmlns:r="http://schemas.openxmlformats.org/officeDocument/2006/relationships" xmlns:p="http://schemas.openxmlformats.org/presentationml/2006/main">
+  <p:cSld>
+    <p:spTree>
+      <p:nvGrpSpPr>
+        <p:cNvPr id="1" name=""/>
+        <p:cNvGrpSpPr/>
+        <p:nvPr/>
+      </p:nvGrpSpPr>
+      <p:grpSpPr>
+        <a:xfrm>
+          <a:off x="0" y="0"/>
+          <a:ext cx="0" cy="0"/>
+          <a:chOff x="0" y="0"/>
+          <a:chExt cx="0" cy="0"/>
+        </a:xfrm>
+      </p:grpSpPr>
+      <p:sp>
+        <p:nvSpPr>
+          <p:cNvPr id="2" name="Folienbildplatzhalter 1"/>
+          <p:cNvSpPr>
+            <a:spLocks noGrp="1" noRot="1" noChangeAspect="1"/>
+          </p:cNvSpPr>
+          <p:nvPr>
+            <p:ph type="sldImg"/>
+          </p:nvPr>
+        </p:nvSpPr>
+        <p:spPr/>
+      </p:sp>
+      <p:sp>
+        <p:nvSpPr>
+          <p:cNvPr id="3" name="Notizenplatzhalter 2"/>
+          <p:cNvSpPr>
+            <a:spLocks noGrp="1"/>
+          </p:cNvSpPr>
+          <p:nvPr>
+            <p:ph type="body" idx="1"/>
+          </p:nvPr>
+        </p:nvSpPr>
+        <p:spPr/>
+        <p:txBody>
+          <a:bodyPr/>
+          <a:lstStyle/>
+          <a:p>
+            <a:endParaRPr lang="de-DE" dirty="0"/>
+          </a:p>
+        </p:txBody>
+      </p:sp>
+    </p:spTree>
+    <p:extLst>
+      <p:ext uri="{BB962C8B-B14F-4D97-AF65-F5344CB8AC3E}">
+        <p14:creationId xmlns:p14="http://schemas.microsoft.com/office/powerpoint/2010/main" val="2828701232"/>
       </p:ext>
     </p:extLst>
   </p:cSld>
@@ -5792,7 +5854,7 @@
 </file>
 
 <file path=ppt/slides/slide2.xml><?xml version="1.0" encoding="utf-8"?>
-<p:sld xmlns:a="http://schemas.openxmlformats.org/drawingml/2006/main" xmlns:r="http://schemas.openxmlformats.org/officeDocument/2006/relationships" xmlns:p="http://schemas.openxmlformats.org/presentationml/2006/main">
+<p:sld xmlns:a="http://schemas.openxmlformats.org/drawingml/2006/main" xmlns:r="http://schemas.openxmlformats.org/officeDocument/2006/relationships" xmlns:p="http://schemas.openxmlformats.org/presentationml/2006/main" show="0">
   <p:cSld>
     <p:spTree>
       <p:nvGrpSpPr>
@@ -5996,7 +6058,7 @@
 </file>
 
 <file path=ppt/slides/slide3.xml><?xml version="1.0" encoding="utf-8"?>
-<p:sld xmlns:a="http://schemas.openxmlformats.org/drawingml/2006/main" xmlns:r="http://schemas.openxmlformats.org/officeDocument/2006/relationships" xmlns:p="http://schemas.openxmlformats.org/presentationml/2006/main">
+<p:sld xmlns:a="http://schemas.openxmlformats.org/drawingml/2006/main" xmlns:r="http://schemas.openxmlformats.org/officeDocument/2006/relationships" xmlns:p="http://schemas.openxmlformats.org/presentationml/2006/main" show="0">
   <p:cSld>
     <p:spTree>
       <p:nvGrpSpPr>
@@ -6318,7 +6380,7 @@
 </file>
 
 <file path=ppt/slides/slide5.xml><?xml version="1.0" encoding="utf-8"?>
-<p:sld xmlns:a="http://schemas.openxmlformats.org/drawingml/2006/main" xmlns:r="http://schemas.openxmlformats.org/officeDocument/2006/relationships" xmlns:p="http://schemas.openxmlformats.org/presentationml/2006/main">
+<p:sld xmlns:a="http://schemas.openxmlformats.org/drawingml/2006/main" xmlns:r="http://schemas.openxmlformats.org/officeDocument/2006/relationships" xmlns:p="http://schemas.openxmlformats.org/presentationml/2006/main" show="0">
   <p:cSld>
     <p:spTree>
       <p:nvGrpSpPr>
@@ -6703,6 +6765,157 @@
     <p:extLst>
       <p:ext uri="{BB962C8B-B14F-4D97-AF65-F5344CB8AC3E}">
         <p14:creationId xmlns:p14="http://schemas.microsoft.com/office/powerpoint/2010/main" val="3349116758"/>
+      </p:ext>
+    </p:extLst>
+  </p:cSld>
+  <p:clrMapOvr>
+    <a:masterClrMapping/>
+  </p:clrMapOvr>
+</p:sld>
+</file>
+
+<file path=ppt/slides/slide8.xml><?xml version="1.0" encoding="utf-8"?>
+<p:sld xmlns:a="http://schemas.openxmlformats.org/drawingml/2006/main" xmlns:r="http://schemas.openxmlformats.org/officeDocument/2006/relationships" xmlns:p="http://schemas.openxmlformats.org/presentationml/2006/main">
+  <p:cSld>
+    <p:spTree>
+      <p:nvGrpSpPr>
+        <p:cNvPr id="1" name=""/>
+        <p:cNvGrpSpPr/>
+        <p:nvPr/>
+      </p:nvGrpSpPr>
+      <p:grpSpPr>
+        <a:xfrm>
+          <a:off x="0" y="0"/>
+          <a:ext cx="0" cy="0"/>
+          <a:chOff x="0" y="0"/>
+          <a:chExt cx="0" cy="0"/>
+        </a:xfrm>
+      </p:grpSpPr>
+      <p:sp>
+        <p:nvSpPr>
+          <p:cNvPr id="2" name="Titel 1">
+            <a:extLst>
+              <a:ext uri="{FF2B5EF4-FFF2-40B4-BE49-F238E27FC236}">
+                <a16:creationId xmlns:a16="http://schemas.microsoft.com/office/drawing/2014/main" id="{60CD2517-B535-4D82-8789-A20BD068DB30}"/>
+              </a:ext>
+            </a:extLst>
+          </p:cNvPr>
+          <p:cNvSpPr>
+            <a:spLocks noGrp="1"/>
+          </p:cNvSpPr>
+          <p:nvPr>
+            <p:ph type="title"/>
+          </p:nvPr>
+        </p:nvSpPr>
+        <p:spPr/>
+        <p:txBody>
+          <a:bodyPr>
+            <a:normAutofit fontScale="90000"/>
+          </a:bodyPr>
+          <a:lstStyle/>
+          <a:p>
+            <a:r>
+              <a:rPr lang="de-DE" dirty="0"/>
+              <a:t>Settlement </a:t>
+            </a:r>
+            <a:r>
+              <a:rPr lang="de-DE" dirty="0" err="1"/>
+              <a:t>Algorithm</a:t>
+            </a:r>
+            <a:endParaRPr lang="de-DE" dirty="0"/>
+          </a:p>
+        </p:txBody>
+      </p:sp>
+      <p:sp>
+        <p:nvSpPr>
+          <p:cNvPr id="3" name="Textplatzhalter 2">
+            <a:extLst>
+              <a:ext uri="{FF2B5EF4-FFF2-40B4-BE49-F238E27FC236}">
+                <a16:creationId xmlns:a16="http://schemas.microsoft.com/office/drawing/2014/main" id="{A21DDEF0-926C-4269-927F-ECAACEAB9AF0}"/>
+              </a:ext>
+            </a:extLst>
+          </p:cNvPr>
+          <p:cNvSpPr>
+            <a:spLocks noGrp="1"/>
+          </p:cNvSpPr>
+          <p:nvPr>
+            <p:ph type="body" idx="1"/>
+          </p:nvPr>
+        </p:nvSpPr>
+        <p:spPr/>
+        <p:txBody>
+          <a:bodyPr/>
+          <a:lstStyle/>
+          <a:p>
+            <a:pPr marL="114300" indent="0">
+              <a:buNone/>
+            </a:pPr>
+            <a:endParaRPr lang="de-DE" dirty="0"/>
+          </a:p>
+        </p:txBody>
+      </p:sp>
+      <p:pic>
+        <p:nvPicPr>
+          <p:cNvPr id="5" name="Grafik 4">
+            <a:extLst>
+              <a:ext uri="{FF2B5EF4-FFF2-40B4-BE49-F238E27FC236}">
+                <a16:creationId xmlns:a16="http://schemas.microsoft.com/office/drawing/2014/main" id="{94CD5B8C-355B-4A1E-98E0-4EB61ED93890}"/>
+              </a:ext>
+            </a:extLst>
+          </p:cNvPr>
+          <p:cNvPicPr>
+            <a:picLocks noChangeAspect="1"/>
+          </p:cNvPicPr>
+          <p:nvPr/>
+        </p:nvPicPr>
+        <p:blipFill rotWithShape="1">
+          <a:blip r:embed="rId3"/>
+          <a:srcRect b="38828"/>
+          <a:stretch/>
+        </p:blipFill>
+        <p:spPr>
+          <a:xfrm>
+            <a:off x="854283" y="1085973"/>
+            <a:ext cx="3076586" cy="3979467"/>
+          </a:xfrm>
+          <a:prstGeom prst="rect">
+            <a:avLst/>
+          </a:prstGeom>
+        </p:spPr>
+      </p:pic>
+      <p:pic>
+        <p:nvPicPr>
+          <p:cNvPr id="7" name="Grafik 6">
+            <a:extLst>
+              <a:ext uri="{FF2B5EF4-FFF2-40B4-BE49-F238E27FC236}">
+                <a16:creationId xmlns:a16="http://schemas.microsoft.com/office/drawing/2014/main" id="{63DE3946-3B27-4472-A919-366E9C9FC652}"/>
+              </a:ext>
+            </a:extLst>
+          </p:cNvPr>
+          <p:cNvPicPr>
+            <a:picLocks noChangeAspect="1"/>
+          </p:cNvPicPr>
+          <p:nvPr/>
+        </p:nvPicPr>
+        <p:blipFill rotWithShape="1">
+          <a:blip r:embed="rId3"/>
+          <a:srcRect t="59808"/>
+          <a:stretch/>
+        </p:blipFill>
+        <p:spPr>
+          <a:xfrm>
+            <a:off x="4746058" y="1017724"/>
+            <a:ext cx="3076585" cy="2614665"/>
+          </a:xfrm>
+          <a:prstGeom prst="rect">
+            <a:avLst/>
+          </a:prstGeom>
+        </p:spPr>
+      </p:pic>
+    </p:spTree>
+    <p:extLst>
+      <p:ext uri="{BB962C8B-B14F-4D97-AF65-F5344CB8AC3E}">
+        <p14:creationId xmlns:p14="http://schemas.microsoft.com/office/powerpoint/2010/main" val="1225502403"/>
       </p:ext>
     </p:extLst>
   </p:cSld>

</xml_diff>

<commit_message>
Add basic structure to midterm presentation slides
</commit_message>
<xml_diff>
--- a/documentation/Milestone Presentation.pptx
+++ b/documentation/Milestone Presentation.pptx
@@ -5,17 +5,20 @@
     <p:sldMasterId id="2147483660" r:id="rId1"/>
   </p:sldMasterIdLst>
   <p:notesMasterIdLst>
-    <p:notesMasterId r:id="rId10"/>
+    <p:notesMasterId r:id="rId13"/>
   </p:notesMasterIdLst>
   <p:sldIdLst>
     <p:sldId id="256" r:id="rId2"/>
-    <p:sldId id="257" r:id="rId3"/>
-    <p:sldId id="258" r:id="rId4"/>
+    <p:sldId id="266" r:id="rId3"/>
+    <p:sldId id="267" r:id="rId4"/>
     <p:sldId id="262" r:id="rId5"/>
-    <p:sldId id="260" r:id="rId6"/>
-    <p:sldId id="263" r:id="rId7"/>
-    <p:sldId id="264" r:id="rId8"/>
-    <p:sldId id="265" r:id="rId9"/>
+    <p:sldId id="268" r:id="rId6"/>
+    <p:sldId id="271" r:id="rId7"/>
+    <p:sldId id="263" r:id="rId8"/>
+    <p:sldId id="264" r:id="rId9"/>
+    <p:sldId id="265" r:id="rId10"/>
+    <p:sldId id="270" r:id="rId11"/>
+    <p:sldId id="269" r:id="rId12"/>
   </p:sldIdLst>
   <p:sldSz cx="9144000" cy="5143500" type="screen16x9"/>
   <p:notesSz cx="6858000" cy="9144000"/>
@@ -139,47 +142,6 @@
   <p:cmAuthor id="1" name="Myron R" initials="" lastIdx="1" clrIdx="1"/>
   <p:cmAuthor id="2" name="Dong-Ha Kim" initials="" lastIdx="2" clrIdx="2"/>
 </p:cmAuthorLst>
-</file>
-
-<file path=ppt/comments/comment1.xml><?xml version="1.0" encoding="utf-8"?>
-<p:cmLst xmlns:a="http://schemas.openxmlformats.org/drawingml/2006/main" xmlns:r="http://schemas.openxmlformats.org/officeDocument/2006/relationships" xmlns:p="http://schemas.openxmlformats.org/presentationml/2006/main">
-  <p:cm authorId="0" dt="2019-04-23T07:18:16.699" idx="4">
-    <p:pos x="196" y="825"/>
-    <p:text>+Imperative mood
-+Setting Upstream</p:text>
-  </p:cm>
-  <p:cm authorId="1" dt="2019-04-23T08:25:09.365" idx="1">
-    <p:pos x="196" y="725"/>
-    <p:text>Sounds good, is there any tool to integrate a point-based system?</p:text>
-  </p:cm>
-  <p:cm authorId="2" dt="2019-04-23T08:35:38.625" idx="1">
-    <p:pos x="196" y="725"/>
-    <p:text>Can you elaborate more on what you mean with point-based system?</p:text>
-  </p:cm>
-  <p:cm authorId="0" dt="2019-04-23T08:47:20.337" idx="2">
-    <p:pos x="196" y="725"/>
-    <p:text>A rough idea could be as follows:-
--2 : Do not submit (has serious issues in logic)
--1 : Has some issues (doubtful logic, lint checks, etc)
-0 : Not Reviewed by X
-+1 : Seems good to Reviewer X
-We can set +2 or +3 as acceptable and then merge them.</p:text>
-  </p:cm>
-  <p:cm authorId="0" dt="2019-04-23T08:49:20.719" idx="3">
-    <p:pos x="196" y="725"/>
-    <p:text>There is Gerrit which follows similar point-based review but it's probably overkill for our project.</p:text>
-  </p:cm>
-  <p:cm authorId="0" dt="2019-04-23T08:55:17.971" idx="1">
-    <p:pos x="196" y="725"/>
-    <p:text>I would suggest a point-based system for review.
--2,-1,0,+1 or something similar.
-How does it sound to you ?</p:text>
-  </p:cm>
-  <p:cm authorId="2" dt="2019-04-23T08:55:17.971" idx="2">
-    <p:pos x="196" y="725"/>
-    <p:text>Interesting I like it. But how do give this points? As a review comment on the PR or via an emoji?</p:text>
-  </p:cm>
-</p:cmLst>
 </file>
 
 <file path=ppt/notesMasters/notesMaster1.xml><?xml version="1.0" encoding="utf-8"?>
@@ -736,11 +698,11 @@
 </file>
 
 <file path=ppt/notesSlides/notesSlide2.xml><?xml version="1.0" encoding="utf-8"?>
-<p:notes xmlns:a="http://schemas.openxmlformats.org/drawingml/2006/main" xmlns:r="http://schemas.openxmlformats.org/officeDocument/2006/relationships" xmlns:p="http://schemas.openxmlformats.org/presentationml/2006/main" showMasterSp="0" showMasterPhAnim="0">
+<p:notes xmlns:a="http://schemas.openxmlformats.org/drawingml/2006/main" xmlns:r="http://schemas.openxmlformats.org/officeDocument/2006/relationships" xmlns:p="http://schemas.openxmlformats.org/presentationml/2006/main">
   <p:cSld>
     <p:spTree>
       <p:nvGrpSpPr>
-        <p:cNvPr id="1" name="Shape 56"/>
+        <p:cNvPr id="1" name=""/>
         <p:cNvGrpSpPr/>
         <p:nvPr/>
       </p:nvGrpSpPr>
@@ -754,12 +716,12 @@
       </p:grpSpPr>
       <p:sp>
         <p:nvSpPr>
-          <p:cNvPr id="57" name="Google Shape;57;g569465023a_0_45:notes"/>
+          <p:cNvPr id="2" name="Folienbildplatzhalter 1"/>
           <p:cNvSpPr>
             <a:spLocks noGrp="1" noRot="1" noChangeAspect="1"/>
           </p:cNvSpPr>
           <p:nvPr>
-            <p:ph type="sldImg" idx="2"/>
+            <p:ph type="sldImg"/>
           </p:nvPr>
         </p:nvSpPr>
         <p:spPr>
@@ -767,74 +729,37 @@
             <a:off x="381000" y="685800"/>
             <a:ext cx="6096000" cy="3429000"/>
           </a:xfrm>
-          <a:custGeom>
-            <a:avLst/>
-            <a:gdLst/>
-            <a:ahLst/>
-            <a:cxnLst/>
-            <a:rect l="l" t="t" r="r" b="b"/>
-            <a:pathLst>
-              <a:path w="120000" h="120000" extrusionOk="0">
-                <a:moveTo>
-                  <a:pt x="0" y="0"/>
-                </a:moveTo>
-                <a:lnTo>
-                  <a:pt x="120000" y="0"/>
-                </a:lnTo>
-                <a:lnTo>
-                  <a:pt x="120000" y="120000"/>
-                </a:lnTo>
-                <a:lnTo>
-                  <a:pt x="0" y="120000"/>
-                </a:lnTo>
-                <a:close/>
-              </a:path>
-            </a:pathLst>
-          </a:custGeom>
         </p:spPr>
       </p:sp>
       <p:sp>
         <p:nvSpPr>
-          <p:cNvPr id="58" name="Google Shape;58;g569465023a_0_45:notes"/>
-          <p:cNvSpPr txBox="1">
+          <p:cNvPr id="3" name="Notizenplatzhalter 2"/>
+          <p:cNvSpPr>
             <a:spLocks noGrp="1"/>
           </p:cNvSpPr>
           <p:nvPr>
             <p:ph type="body" idx="1"/>
           </p:nvPr>
         </p:nvSpPr>
-        <p:spPr>
-          <a:xfrm>
-            <a:off x="685800" y="4343400"/>
-            <a:ext cx="5486400" cy="4114800"/>
-          </a:xfrm>
-          <a:prstGeom prst="rect">
-            <a:avLst/>
-          </a:prstGeom>
-        </p:spPr>
-        <p:txBody>
-          <a:bodyPr spcFirstLastPara="1" wrap="square" lIns="91425" tIns="91425" rIns="91425" bIns="91425" anchor="t" anchorCtr="0">
-            <a:noAutofit/>
-          </a:bodyPr>
-          <a:lstStyle/>
-          <a:p>
-            <a:pPr marL="0" lvl="0" indent="0" algn="l" rtl="0">
-              <a:spcBef>
-                <a:spcPts val="0"/>
-              </a:spcBef>
-              <a:spcAft>
-                <a:spcPts val="0"/>
-              </a:spcAft>
+        <p:spPr/>
+        <p:txBody>
+          <a:bodyPr/>
+          <a:lstStyle/>
+          <a:p>
+            <a:pPr marL="158750" indent="0">
+              <a:buFont typeface="Symbol" panose="05050102010706020507" pitchFamily="18" charset="2"/>
               <a:buNone/>
             </a:pPr>
-            <a:endParaRPr/>
+            <a:endParaRPr lang="de-DE" baseline="0" dirty="0">
+              <a:sym typeface="Wingdings" panose="05000000000000000000" pitchFamily="2" charset="2"/>
+            </a:endParaRPr>
           </a:p>
         </p:txBody>
       </p:sp>
     </p:spTree>
     <p:extLst>
       <p:ext uri="{BB962C8B-B14F-4D97-AF65-F5344CB8AC3E}">
-        <p14:creationId xmlns:p14="http://schemas.microsoft.com/office/powerpoint/2010/main" val="2854062227"/>
+        <p14:creationId xmlns:p14="http://schemas.microsoft.com/office/powerpoint/2010/main" val="442979678"/>
       </p:ext>
     </p:extLst>
   </p:cSld>
@@ -845,11 +770,11 @@
 </file>
 
 <file path=ppt/notesSlides/notesSlide3.xml><?xml version="1.0" encoding="utf-8"?>
-<p:notes xmlns:a="http://schemas.openxmlformats.org/drawingml/2006/main" xmlns:r="http://schemas.openxmlformats.org/officeDocument/2006/relationships" xmlns:p="http://schemas.openxmlformats.org/presentationml/2006/main" showMasterSp="0" showMasterPhAnim="0">
+<p:notes xmlns:a="http://schemas.openxmlformats.org/drawingml/2006/main" xmlns:r="http://schemas.openxmlformats.org/officeDocument/2006/relationships" xmlns:p="http://schemas.openxmlformats.org/presentationml/2006/main">
   <p:cSld>
     <p:spTree>
       <p:nvGrpSpPr>
-        <p:cNvPr id="1" name="Shape 62"/>
+        <p:cNvPr id="1" name=""/>
         <p:cNvGrpSpPr/>
         <p:nvPr/>
       </p:nvGrpSpPr>
@@ -863,12 +788,12 @@
       </p:grpSpPr>
       <p:sp>
         <p:nvSpPr>
-          <p:cNvPr id="63" name="Google Shape;63;g569465023a_0_50:notes"/>
+          <p:cNvPr id="2" name="Folienbildplatzhalter 1"/>
           <p:cNvSpPr>
             <a:spLocks noGrp="1" noRot="1" noChangeAspect="1"/>
           </p:cNvSpPr>
           <p:nvPr>
-            <p:ph type="sldImg" idx="2"/>
+            <p:ph type="sldImg"/>
           </p:nvPr>
         </p:nvSpPr>
         <p:spPr>
@@ -876,74 +801,31 @@
             <a:off x="381000" y="685800"/>
             <a:ext cx="6096000" cy="3429000"/>
           </a:xfrm>
-          <a:custGeom>
-            <a:avLst/>
-            <a:gdLst/>
-            <a:ahLst/>
-            <a:cxnLst/>
-            <a:rect l="l" t="t" r="r" b="b"/>
-            <a:pathLst>
-              <a:path w="120000" h="120000" extrusionOk="0">
-                <a:moveTo>
-                  <a:pt x="0" y="0"/>
-                </a:moveTo>
-                <a:lnTo>
-                  <a:pt x="120000" y="0"/>
-                </a:lnTo>
-                <a:lnTo>
-                  <a:pt x="120000" y="120000"/>
-                </a:lnTo>
-                <a:lnTo>
-                  <a:pt x="0" y="120000"/>
-                </a:lnTo>
-                <a:close/>
-              </a:path>
-            </a:pathLst>
-          </a:custGeom>
         </p:spPr>
       </p:sp>
       <p:sp>
         <p:nvSpPr>
-          <p:cNvPr id="64" name="Google Shape;64;g569465023a_0_50:notes"/>
-          <p:cNvSpPr txBox="1">
+          <p:cNvPr id="3" name="Notizenplatzhalter 2"/>
+          <p:cNvSpPr>
             <a:spLocks noGrp="1"/>
           </p:cNvSpPr>
           <p:nvPr>
             <p:ph type="body" idx="1"/>
           </p:nvPr>
         </p:nvSpPr>
-        <p:spPr>
-          <a:xfrm>
-            <a:off x="685800" y="4343400"/>
-            <a:ext cx="5486400" cy="4114800"/>
-          </a:xfrm>
-          <a:prstGeom prst="rect">
-            <a:avLst/>
-          </a:prstGeom>
-        </p:spPr>
-        <p:txBody>
-          <a:bodyPr spcFirstLastPara="1" wrap="square" lIns="91425" tIns="91425" rIns="91425" bIns="91425" anchor="t" anchorCtr="0">
-            <a:noAutofit/>
-          </a:bodyPr>
-          <a:lstStyle/>
-          <a:p>
-            <a:pPr marL="0" lvl="0" indent="0" algn="l" rtl="0">
-              <a:spcBef>
-                <a:spcPts val="0"/>
-              </a:spcBef>
-              <a:spcAft>
-                <a:spcPts val="0"/>
-              </a:spcAft>
-              <a:buNone/>
-            </a:pPr>
-            <a:endParaRPr/>
+        <p:spPr/>
+        <p:txBody>
+          <a:bodyPr/>
+          <a:lstStyle/>
+          <a:p>
+            <a:endParaRPr lang="de-DE" dirty="0"/>
           </a:p>
         </p:txBody>
       </p:sp>
     </p:spTree>
     <p:extLst>
       <p:ext uri="{BB962C8B-B14F-4D97-AF65-F5344CB8AC3E}">
-        <p14:creationId xmlns:p14="http://schemas.microsoft.com/office/powerpoint/2010/main" val="160949215"/>
+        <p14:creationId xmlns:p14="http://schemas.microsoft.com/office/powerpoint/2010/main" val="2510380856"/>
       </p:ext>
     </p:extLst>
   </p:cSld>
@@ -1002,708 +884,14 @@
           <a:bodyPr/>
           <a:lstStyle/>
           <a:p>
-            <a:pPr marL="158750" indent="0">
-              <a:buFont typeface="Symbol" panose="05050102010706020507" pitchFamily="18" charset="2"/>
-              <a:buNone/>
-            </a:pPr>
-            <a:r>
-              <a:rPr lang="de-DE" dirty="0" err="1"/>
-              <a:t>Changes</a:t>
-            </a:r>
-            <a:r>
-              <a:rPr lang="de-DE" baseline="0" dirty="0"/>
-              <a:t> (2.0 </a:t>
-            </a:r>
-            <a:r>
-              <a:rPr lang="de-DE" baseline="0" dirty="0">
-                <a:sym typeface="Wingdings" panose="05000000000000000000" pitchFamily="2" charset="2"/>
-              </a:rPr>
-              <a:t> 3.0)</a:t>
-            </a:r>
             <a:endParaRPr lang="de-DE" dirty="0"/>
-          </a:p>
-          <a:p>
-            <a:pPr marL="457200" indent="-298450">
-              <a:buFont typeface="Symbol" panose="05050102010706020507" pitchFamily="18" charset="2"/>
-              <a:buChar char="-"/>
-            </a:pPr>
-            <a:r>
-              <a:rPr lang="de-DE" dirty="0"/>
-              <a:t>3 </a:t>
-            </a:r>
-            <a:r>
-              <a:rPr lang="de-DE" dirty="0" err="1"/>
-              <a:t>input</a:t>
-            </a:r>
-            <a:r>
-              <a:rPr lang="de-DE" baseline="0" dirty="0"/>
-              <a:t> </a:t>
-            </a:r>
-            <a:r>
-              <a:rPr lang="de-DE" baseline="0" dirty="0" err="1"/>
-              <a:t>sensors</a:t>
-            </a:r>
-            <a:r>
-              <a:rPr lang="de-DE" baseline="0" dirty="0"/>
-              <a:t> (</a:t>
-            </a:r>
-            <a:r>
-              <a:rPr lang="de-DE" baseline="0" dirty="0" err="1"/>
-              <a:t>consumed</a:t>
-            </a:r>
-            <a:r>
-              <a:rPr lang="de-DE" baseline="0" dirty="0"/>
-              <a:t>, </a:t>
-            </a:r>
-            <a:r>
-              <a:rPr lang="de-DE" baseline="0" dirty="0" err="1"/>
-              <a:t>produced</a:t>
-            </a:r>
-            <a:r>
-              <a:rPr lang="de-DE" baseline="0" dirty="0"/>
-              <a:t>, </a:t>
-            </a:r>
-            <a:r>
-              <a:rPr lang="de-DE" baseline="0" dirty="0" err="1"/>
-              <a:t>battery</a:t>
-            </a:r>
-            <a:r>
-              <a:rPr lang="de-DE" baseline="0" dirty="0"/>
-              <a:t>)</a:t>
-            </a:r>
-          </a:p>
-          <a:p>
-            <a:pPr marL="457200" indent="-298450">
-              <a:buFont typeface="Symbol" panose="05050102010706020507" pitchFamily="18" charset="2"/>
-              <a:buChar char="-"/>
-            </a:pPr>
-            <a:r>
-              <a:rPr lang="de-DE" baseline="0" dirty="0" err="1"/>
-              <a:t>No</a:t>
-            </a:r>
-            <a:r>
-              <a:rPr lang="de-DE" baseline="0" dirty="0"/>
-              <a:t> </a:t>
-            </a:r>
-            <a:r>
-              <a:rPr lang="de-DE" baseline="0" dirty="0" err="1"/>
-              <a:t>shared</a:t>
-            </a:r>
-            <a:r>
-              <a:rPr lang="de-DE" baseline="0" dirty="0"/>
-              <a:t> private </a:t>
-            </a:r>
-            <a:r>
-              <a:rPr lang="de-DE" baseline="0" dirty="0" err="1"/>
-              <a:t>key</a:t>
-            </a:r>
-            <a:r>
-              <a:rPr lang="de-DE" baseline="0" dirty="0"/>
-              <a:t> </a:t>
-            </a:r>
-            <a:r>
-              <a:rPr lang="de-DE" baseline="0" dirty="0" err="1"/>
-              <a:t>inside</a:t>
-            </a:r>
-            <a:r>
-              <a:rPr lang="de-DE" baseline="0" dirty="0"/>
-              <a:t> </a:t>
-            </a:r>
-            <a:r>
-              <a:rPr lang="de-DE" baseline="0" dirty="0" err="1"/>
-              <a:t>the</a:t>
-            </a:r>
-            <a:r>
-              <a:rPr lang="de-DE" baseline="0" dirty="0"/>
-              <a:t> </a:t>
-            </a:r>
-            <a:r>
-              <a:rPr lang="de-DE" baseline="0" dirty="0" err="1"/>
-              <a:t>Household</a:t>
-            </a:r>
-            <a:r>
-              <a:rPr lang="de-DE" baseline="0" dirty="0"/>
-              <a:t> Processing </a:t>
-            </a:r>
-            <a:r>
-              <a:rPr lang="de-DE" baseline="0" dirty="0" err="1"/>
-              <a:t>unit</a:t>
-            </a:r>
-            <a:r>
-              <a:rPr lang="de-DE" baseline="0" dirty="0"/>
-              <a:t> </a:t>
-            </a:r>
-            <a:r>
-              <a:rPr lang="de-DE" baseline="0" dirty="0">
-                <a:sym typeface="Wingdings" panose="05000000000000000000" pitchFamily="2" charset="2"/>
-              </a:rPr>
-              <a:t> HHS </a:t>
-            </a:r>
-            <a:r>
-              <a:rPr lang="de-DE" baseline="0" dirty="0" err="1">
-                <a:sym typeface="Wingdings" panose="05000000000000000000" pitchFamily="2" charset="2"/>
-              </a:rPr>
-              <a:t>asks</a:t>
-            </a:r>
-            <a:r>
-              <a:rPr lang="de-DE" baseline="0" dirty="0">
-                <a:sym typeface="Wingdings" panose="05000000000000000000" pitchFamily="2" charset="2"/>
-              </a:rPr>
-              <a:t> </a:t>
-            </a:r>
-            <a:r>
-              <a:rPr lang="de-DE" baseline="0" dirty="0" err="1">
-                <a:sym typeface="Wingdings" panose="05000000000000000000" pitchFamily="2" charset="2"/>
-              </a:rPr>
-              <a:t>the</a:t>
-            </a:r>
-            <a:r>
-              <a:rPr lang="de-DE" baseline="0" dirty="0">
-                <a:sym typeface="Wingdings" panose="05000000000000000000" pitchFamily="2" charset="2"/>
-              </a:rPr>
-              <a:t> </a:t>
-            </a:r>
-            <a:r>
-              <a:rPr lang="de-DE" baseline="0" dirty="0" err="1">
-                <a:sym typeface="Wingdings" panose="05000000000000000000" pitchFamily="2" charset="2"/>
-              </a:rPr>
-              <a:t>parity</a:t>
-            </a:r>
-            <a:r>
-              <a:rPr lang="de-DE" baseline="0" dirty="0">
-                <a:sym typeface="Wingdings" panose="05000000000000000000" pitchFamily="2" charset="2"/>
-              </a:rPr>
-              <a:t> </a:t>
-            </a:r>
-            <a:r>
-              <a:rPr lang="de-DE" baseline="0" dirty="0" err="1">
-                <a:sym typeface="Wingdings" panose="05000000000000000000" pitchFamily="2" charset="2"/>
-              </a:rPr>
-              <a:t>client</a:t>
-            </a:r>
-            <a:r>
-              <a:rPr lang="de-DE" baseline="0" dirty="0">
-                <a:sym typeface="Wingdings" panose="05000000000000000000" pitchFamily="2" charset="2"/>
-              </a:rPr>
-              <a:t> </a:t>
-            </a:r>
-            <a:r>
-              <a:rPr lang="de-DE" baseline="0" dirty="0" err="1">
-                <a:sym typeface="Wingdings" panose="05000000000000000000" pitchFamily="2" charset="2"/>
-              </a:rPr>
-              <a:t>to</a:t>
-            </a:r>
-            <a:r>
-              <a:rPr lang="de-DE" baseline="0" dirty="0">
-                <a:sym typeface="Wingdings" panose="05000000000000000000" pitchFamily="2" charset="2"/>
-              </a:rPr>
-              <a:t> lock/ </a:t>
-            </a:r>
-            <a:r>
-              <a:rPr lang="de-DE" baseline="0" dirty="0" err="1">
-                <a:sym typeface="Wingdings" panose="05000000000000000000" pitchFamily="2" charset="2"/>
-              </a:rPr>
-              <a:t>unlock</a:t>
-            </a:r>
-            <a:r>
-              <a:rPr lang="de-DE" baseline="0" dirty="0">
-                <a:sym typeface="Wingdings" panose="05000000000000000000" pitchFamily="2" charset="2"/>
-              </a:rPr>
-              <a:t> </a:t>
-            </a:r>
-            <a:r>
-              <a:rPr lang="de-DE" baseline="0" dirty="0" err="1">
-                <a:sym typeface="Wingdings" panose="05000000000000000000" pitchFamily="2" charset="2"/>
-              </a:rPr>
-              <a:t>the</a:t>
-            </a:r>
-            <a:r>
-              <a:rPr lang="de-DE" baseline="0" dirty="0">
-                <a:sym typeface="Wingdings" panose="05000000000000000000" pitchFamily="2" charset="2"/>
-              </a:rPr>
-              <a:t> </a:t>
-            </a:r>
-            <a:r>
-              <a:rPr lang="de-DE" baseline="0" dirty="0" err="1">
-                <a:sym typeface="Wingdings" panose="05000000000000000000" pitchFamily="2" charset="2"/>
-              </a:rPr>
-              <a:t>account</a:t>
-            </a:r>
-            <a:r>
-              <a:rPr lang="de-DE" baseline="0" dirty="0">
-                <a:sym typeface="Wingdings" panose="05000000000000000000" pitchFamily="2" charset="2"/>
-              </a:rPr>
-              <a:t> </a:t>
-            </a:r>
-            <a:r>
-              <a:rPr lang="de-DE" baseline="0" dirty="0" err="1">
-                <a:sym typeface="Wingdings" panose="05000000000000000000" pitchFamily="2" charset="2"/>
-              </a:rPr>
-              <a:t>i.o</a:t>
-            </a:r>
-            <a:r>
-              <a:rPr lang="de-DE" baseline="0" dirty="0">
-                <a:sym typeface="Wingdings" panose="05000000000000000000" pitchFamily="2" charset="2"/>
-              </a:rPr>
-              <a:t>. </a:t>
-            </a:r>
-            <a:r>
-              <a:rPr lang="de-DE" baseline="0" dirty="0" err="1">
-                <a:sym typeface="Wingdings" panose="05000000000000000000" pitchFamily="2" charset="2"/>
-              </a:rPr>
-              <a:t>to</a:t>
-            </a:r>
-            <a:r>
-              <a:rPr lang="de-DE" baseline="0" dirty="0">
-                <a:sym typeface="Wingdings" panose="05000000000000000000" pitchFamily="2" charset="2"/>
-              </a:rPr>
-              <a:t> send </a:t>
-            </a:r>
-            <a:r>
-              <a:rPr lang="de-DE" baseline="0" dirty="0" err="1">
-                <a:sym typeface="Wingdings" panose="05000000000000000000" pitchFamily="2" charset="2"/>
-              </a:rPr>
-              <a:t>transactions</a:t>
-            </a:r>
-            <a:endParaRPr lang="de-DE" baseline="0" dirty="0">
-              <a:sym typeface="Arial"/>
-            </a:endParaRPr>
-          </a:p>
-          <a:p>
-            <a:pPr marL="457200" indent="-298450">
-              <a:buFont typeface="Symbol" panose="05050102010706020507" pitchFamily="18" charset="2"/>
-              <a:buChar char="-"/>
-            </a:pPr>
-            <a:r>
-              <a:rPr lang="de-DE" baseline="0" dirty="0">
-                <a:sym typeface="Arial"/>
-              </a:rPr>
-              <a:t>User </a:t>
-            </a:r>
-            <a:r>
-              <a:rPr lang="de-DE" baseline="0" dirty="0" err="1">
-                <a:sym typeface="Arial"/>
-              </a:rPr>
-              <a:t>interface</a:t>
-            </a:r>
-            <a:r>
-              <a:rPr lang="de-DE" baseline="0" dirty="0">
-                <a:sym typeface="Arial"/>
-              </a:rPr>
-              <a:t> </a:t>
-            </a:r>
-            <a:r>
-              <a:rPr lang="de-DE" baseline="0" dirty="0" err="1">
-                <a:sym typeface="Arial"/>
-              </a:rPr>
-              <a:t>comunicates</a:t>
-            </a:r>
-            <a:r>
-              <a:rPr lang="de-DE" baseline="0" dirty="0">
-                <a:sym typeface="Arial"/>
-              </a:rPr>
-              <a:t> </a:t>
-            </a:r>
-            <a:r>
-              <a:rPr lang="de-DE" baseline="0" dirty="0" err="1">
-                <a:sym typeface="Arial"/>
-              </a:rPr>
-              <a:t>with</a:t>
-            </a:r>
-            <a:r>
-              <a:rPr lang="de-DE" baseline="0" dirty="0">
-                <a:sym typeface="Arial"/>
-              </a:rPr>
-              <a:t> </a:t>
-            </a:r>
-            <a:r>
-              <a:rPr lang="de-DE" baseline="0" dirty="0" err="1">
-                <a:sym typeface="Arial"/>
-              </a:rPr>
-              <a:t>the</a:t>
-            </a:r>
-            <a:r>
-              <a:rPr lang="de-DE" baseline="0" dirty="0">
-                <a:sym typeface="Arial"/>
-              </a:rPr>
-              <a:t> HHS </a:t>
-            </a:r>
-            <a:r>
-              <a:rPr lang="de-DE" baseline="0" dirty="0" err="1">
-                <a:sym typeface="Arial"/>
-              </a:rPr>
-              <a:t>and</a:t>
-            </a:r>
-            <a:r>
-              <a:rPr lang="de-DE" baseline="0" dirty="0">
-                <a:sym typeface="Arial"/>
-              </a:rPr>
-              <a:t> not </a:t>
-            </a:r>
-            <a:r>
-              <a:rPr lang="de-DE" baseline="0" dirty="0" err="1">
-                <a:sym typeface="Arial"/>
-              </a:rPr>
-              <a:t>the</a:t>
-            </a:r>
-            <a:r>
-              <a:rPr lang="de-DE" baseline="0" dirty="0">
-                <a:sym typeface="Arial"/>
-              </a:rPr>
-              <a:t> DB </a:t>
-            </a:r>
-            <a:r>
-              <a:rPr lang="de-DE" baseline="0" dirty="0" err="1">
-                <a:sym typeface="Arial"/>
-              </a:rPr>
-              <a:t>directly</a:t>
-            </a:r>
-            <a:r>
-              <a:rPr lang="de-DE" baseline="0" dirty="0">
-                <a:sym typeface="Arial"/>
-              </a:rPr>
-              <a:t> </a:t>
-            </a:r>
-            <a:r>
-              <a:rPr lang="de-DE" baseline="0" dirty="0">
-                <a:sym typeface="Wingdings" panose="05000000000000000000" pitchFamily="2" charset="2"/>
-              </a:rPr>
-              <a:t> HHS </a:t>
-            </a:r>
-            <a:r>
-              <a:rPr lang="de-DE" baseline="0" dirty="0" err="1">
-                <a:sym typeface="Wingdings" panose="05000000000000000000" pitchFamily="2" charset="2"/>
-              </a:rPr>
-              <a:t>behaves</a:t>
-            </a:r>
-            <a:r>
-              <a:rPr lang="de-DE" baseline="0" dirty="0">
-                <a:sym typeface="Wingdings" panose="05000000000000000000" pitchFamily="2" charset="2"/>
-              </a:rPr>
-              <a:t> </a:t>
-            </a:r>
-            <a:r>
-              <a:rPr lang="de-DE" baseline="0" dirty="0" err="1">
-                <a:sym typeface="Wingdings" panose="05000000000000000000" pitchFamily="2" charset="2"/>
-              </a:rPr>
-              <a:t>as</a:t>
-            </a:r>
-            <a:r>
-              <a:rPr lang="de-DE" baseline="0" dirty="0">
-                <a:sym typeface="Wingdings" panose="05000000000000000000" pitchFamily="2" charset="2"/>
-              </a:rPr>
-              <a:t> </a:t>
-            </a:r>
-            <a:r>
-              <a:rPr lang="de-DE" baseline="0" dirty="0" err="1">
-                <a:sym typeface="Wingdings" panose="05000000000000000000" pitchFamily="2" charset="2"/>
-              </a:rPr>
-              <a:t>central</a:t>
-            </a:r>
-            <a:r>
-              <a:rPr lang="de-DE" baseline="0" dirty="0">
-                <a:sym typeface="Wingdings" panose="05000000000000000000" pitchFamily="2" charset="2"/>
-              </a:rPr>
-              <a:t> </a:t>
-            </a:r>
-            <a:r>
-              <a:rPr lang="de-DE" baseline="0" dirty="0" err="1">
-                <a:sym typeface="Wingdings" panose="05000000000000000000" pitchFamily="2" charset="2"/>
-              </a:rPr>
-              <a:t>middleware</a:t>
-            </a:r>
-            <a:r>
-              <a:rPr lang="de-DE" baseline="0" dirty="0">
-                <a:sym typeface="Wingdings" panose="05000000000000000000" pitchFamily="2" charset="2"/>
-              </a:rPr>
-              <a:t> </a:t>
-            </a:r>
-            <a:r>
-              <a:rPr lang="de-DE" baseline="0" dirty="0" err="1">
-                <a:sym typeface="Wingdings" panose="05000000000000000000" pitchFamily="2" charset="2"/>
-              </a:rPr>
-              <a:t>inside</a:t>
-            </a:r>
-            <a:r>
-              <a:rPr lang="de-DE" baseline="0" dirty="0">
-                <a:sym typeface="Wingdings" panose="05000000000000000000" pitchFamily="2" charset="2"/>
-              </a:rPr>
-              <a:t> </a:t>
-            </a:r>
-            <a:r>
-              <a:rPr lang="de-DE" baseline="0" dirty="0" err="1">
-                <a:sym typeface="Wingdings" panose="05000000000000000000" pitchFamily="2" charset="2"/>
-              </a:rPr>
-              <a:t>the</a:t>
-            </a:r>
-            <a:r>
-              <a:rPr lang="de-DE" baseline="0" dirty="0">
-                <a:sym typeface="Wingdings" panose="05000000000000000000" pitchFamily="2" charset="2"/>
-              </a:rPr>
-              <a:t> </a:t>
-            </a:r>
-            <a:r>
-              <a:rPr lang="de-DE" baseline="0" dirty="0" err="1">
-                <a:sym typeface="Wingdings" panose="05000000000000000000" pitchFamily="2" charset="2"/>
-              </a:rPr>
-              <a:t>Household</a:t>
-            </a:r>
-            <a:r>
-              <a:rPr lang="de-DE" baseline="0" dirty="0">
-                <a:sym typeface="Wingdings" panose="05000000000000000000" pitchFamily="2" charset="2"/>
-              </a:rPr>
-              <a:t> </a:t>
-            </a:r>
-            <a:r>
-              <a:rPr lang="de-DE" baseline="0" dirty="0" err="1">
-                <a:sym typeface="Wingdings" panose="05000000000000000000" pitchFamily="2" charset="2"/>
-              </a:rPr>
-              <a:t>processing</a:t>
-            </a:r>
-            <a:r>
-              <a:rPr lang="de-DE" baseline="0" dirty="0">
-                <a:sym typeface="Wingdings" panose="05000000000000000000" pitchFamily="2" charset="2"/>
-              </a:rPr>
-              <a:t> </a:t>
-            </a:r>
-            <a:r>
-              <a:rPr lang="de-DE" baseline="0" dirty="0" err="1">
-                <a:sym typeface="Wingdings" panose="05000000000000000000" pitchFamily="2" charset="2"/>
-              </a:rPr>
-              <a:t>unit</a:t>
-            </a:r>
-            <a:endParaRPr lang="de-DE" baseline="0" dirty="0">
-              <a:sym typeface="Wingdings" panose="05000000000000000000" pitchFamily="2" charset="2"/>
-            </a:endParaRPr>
-          </a:p>
-          <a:p>
-            <a:pPr marL="457200" indent="-298450">
-              <a:buFont typeface="Symbol" panose="05050102010706020507" pitchFamily="18" charset="2"/>
-              <a:buChar char="-"/>
-            </a:pPr>
-            <a:r>
-              <a:rPr lang="de-DE" baseline="0" dirty="0" err="1">
-                <a:sym typeface="Wingdings" panose="05000000000000000000" pitchFamily="2" charset="2"/>
-              </a:rPr>
-              <a:t>Netting</a:t>
-            </a:r>
-            <a:r>
-              <a:rPr lang="de-DE" baseline="0" dirty="0">
-                <a:sym typeface="Wingdings" panose="05000000000000000000" pitchFamily="2" charset="2"/>
-              </a:rPr>
-              <a:t> </a:t>
-            </a:r>
-            <a:r>
-              <a:rPr lang="de-DE" baseline="0" dirty="0" err="1">
-                <a:sym typeface="Wingdings" panose="05000000000000000000" pitchFamily="2" charset="2"/>
-              </a:rPr>
-              <a:t>is</a:t>
-            </a:r>
-            <a:r>
-              <a:rPr lang="de-DE" baseline="0" dirty="0">
-                <a:sym typeface="Wingdings" panose="05000000000000000000" pitchFamily="2" charset="2"/>
-              </a:rPr>
-              <a:t> </a:t>
-            </a:r>
-            <a:r>
-              <a:rPr lang="de-DE" baseline="0" dirty="0" err="1">
-                <a:sym typeface="Wingdings" panose="05000000000000000000" pitchFamily="2" charset="2"/>
-              </a:rPr>
-              <a:t>triggered</a:t>
-            </a:r>
-            <a:r>
-              <a:rPr lang="de-DE" baseline="0" dirty="0">
-                <a:sym typeface="Wingdings" panose="05000000000000000000" pitchFamily="2" charset="2"/>
-              </a:rPr>
-              <a:t> </a:t>
-            </a:r>
-            <a:r>
-              <a:rPr lang="de-DE" baseline="0" dirty="0" err="1">
-                <a:sym typeface="Wingdings" panose="05000000000000000000" pitchFamily="2" charset="2"/>
-              </a:rPr>
-              <a:t>by</a:t>
-            </a:r>
-            <a:r>
-              <a:rPr lang="de-DE" baseline="0" dirty="0">
-                <a:sym typeface="Wingdings" panose="05000000000000000000" pitchFamily="2" charset="2"/>
-              </a:rPr>
-              <a:t> </a:t>
-            </a:r>
-            <a:r>
-              <a:rPr lang="de-DE" baseline="0" dirty="0" err="1">
-                <a:sym typeface="Wingdings" panose="05000000000000000000" pitchFamily="2" charset="2"/>
-              </a:rPr>
-              <a:t>the</a:t>
-            </a:r>
-            <a:r>
-              <a:rPr lang="de-DE" baseline="0" dirty="0">
-                <a:sym typeface="Wingdings" panose="05000000000000000000" pitchFamily="2" charset="2"/>
-              </a:rPr>
-              <a:t> </a:t>
-            </a:r>
-            <a:r>
-              <a:rPr lang="de-DE" baseline="0" dirty="0" err="1">
-                <a:sym typeface="Wingdings" panose="05000000000000000000" pitchFamily="2" charset="2"/>
-              </a:rPr>
-              <a:t>Validator</a:t>
-            </a:r>
-            <a:r>
-              <a:rPr lang="de-DE" baseline="0" dirty="0">
-                <a:sym typeface="Wingdings" panose="05000000000000000000" pitchFamily="2" charset="2"/>
-              </a:rPr>
-              <a:t> Set</a:t>
-            </a:r>
-          </a:p>
-          <a:p>
-            <a:pPr marL="914400" lvl="1" indent="-298450">
-              <a:buFont typeface="Symbol" panose="05050102010706020507" pitchFamily="18" charset="2"/>
-              <a:buChar char="-"/>
-            </a:pPr>
-            <a:r>
-              <a:rPr lang="de-DE" baseline="0" dirty="0">
-                <a:sym typeface="Wingdings" panose="05000000000000000000" pitchFamily="2" charset="2"/>
-              </a:rPr>
-              <a:t>In </a:t>
-            </a:r>
-            <a:r>
-              <a:rPr lang="de-DE" baseline="0" dirty="0" err="1">
-                <a:sym typeface="Wingdings" panose="05000000000000000000" pitchFamily="2" charset="2"/>
-              </a:rPr>
-              <a:t>the</a:t>
-            </a:r>
-            <a:r>
-              <a:rPr lang="de-DE" baseline="0" dirty="0">
-                <a:sym typeface="Wingdings" panose="05000000000000000000" pitchFamily="2" charset="2"/>
-              </a:rPr>
-              <a:t> </a:t>
-            </a:r>
-            <a:r>
-              <a:rPr lang="de-DE" baseline="0" dirty="0" err="1">
-                <a:sym typeface="Wingdings" panose="05000000000000000000" pitchFamily="2" charset="2"/>
-              </a:rPr>
-              <a:t>future</a:t>
-            </a:r>
-            <a:r>
-              <a:rPr lang="de-DE" baseline="0" dirty="0">
-                <a:sym typeface="Wingdings" panose="05000000000000000000" pitchFamily="2" charset="2"/>
-              </a:rPr>
-              <a:t>: </a:t>
-            </a:r>
-            <a:r>
-              <a:rPr lang="de-DE" baseline="0" dirty="0" err="1">
-                <a:sym typeface="Wingdings" panose="05000000000000000000" pitchFamily="2" charset="2"/>
-              </a:rPr>
-              <a:t>either</a:t>
-            </a:r>
-            <a:r>
-              <a:rPr lang="de-DE" baseline="0" dirty="0">
-                <a:sym typeface="Wingdings" panose="05000000000000000000" pitchFamily="2" charset="2"/>
-              </a:rPr>
-              <a:t> </a:t>
-            </a:r>
-            <a:r>
-              <a:rPr lang="de-DE" baseline="0" dirty="0" err="1">
-                <a:sym typeface="Wingdings" panose="05000000000000000000" pitchFamily="2" charset="2"/>
-              </a:rPr>
-              <a:t>one</a:t>
-            </a:r>
-            <a:r>
-              <a:rPr lang="de-DE" baseline="0" dirty="0">
-                <a:sym typeface="Wingdings" panose="05000000000000000000" pitchFamily="2" charset="2"/>
-              </a:rPr>
-              <a:t> </a:t>
-            </a:r>
-            <a:r>
-              <a:rPr lang="de-DE" baseline="0" dirty="0" err="1">
-                <a:sym typeface="Wingdings" panose="05000000000000000000" pitchFamily="2" charset="2"/>
-              </a:rPr>
-              <a:t>household</a:t>
-            </a:r>
-            <a:r>
-              <a:rPr lang="de-DE" baseline="0" dirty="0">
-                <a:sym typeface="Wingdings" panose="05000000000000000000" pitchFamily="2" charset="2"/>
-              </a:rPr>
-              <a:t> </a:t>
-            </a:r>
-            <a:r>
-              <a:rPr lang="de-DE" baseline="0" dirty="0" err="1">
-                <a:sym typeface="Wingdings" panose="05000000000000000000" pitchFamily="2" charset="2"/>
-              </a:rPr>
-              <a:t>or</a:t>
-            </a:r>
-            <a:r>
-              <a:rPr lang="de-DE" baseline="0" dirty="0">
-                <a:sym typeface="Wingdings" panose="05000000000000000000" pitchFamily="2" charset="2"/>
-              </a:rPr>
-              <a:t> </a:t>
-            </a:r>
-            <a:r>
-              <a:rPr lang="de-DE" baseline="0" dirty="0" err="1">
-                <a:sym typeface="Wingdings" panose="05000000000000000000" pitchFamily="2" charset="2"/>
-              </a:rPr>
-              <a:t>every</a:t>
-            </a:r>
-            <a:r>
-              <a:rPr lang="de-DE" baseline="0" dirty="0">
-                <a:sym typeface="Wingdings" panose="05000000000000000000" pitchFamily="2" charset="2"/>
-              </a:rPr>
-              <a:t> time a block </a:t>
-            </a:r>
-            <a:r>
-              <a:rPr lang="de-DE" baseline="0" dirty="0" err="1">
-                <a:sym typeface="Wingdings" panose="05000000000000000000" pitchFamily="2" charset="2"/>
-              </a:rPr>
-              <a:t>is</a:t>
-            </a:r>
-            <a:r>
-              <a:rPr lang="de-DE" baseline="0" dirty="0">
-                <a:sym typeface="Wingdings" panose="05000000000000000000" pitchFamily="2" charset="2"/>
-              </a:rPr>
-              <a:t> </a:t>
-            </a:r>
-            <a:r>
-              <a:rPr lang="de-DE" baseline="0" dirty="0" err="1">
-                <a:sym typeface="Wingdings" panose="05000000000000000000" pitchFamily="2" charset="2"/>
-              </a:rPr>
-              <a:t>created</a:t>
-            </a:r>
-            <a:r>
-              <a:rPr lang="de-DE" baseline="0" dirty="0">
-                <a:sym typeface="Wingdings" panose="05000000000000000000" pitchFamily="2" charset="2"/>
-              </a:rPr>
-              <a:t> via </a:t>
-            </a:r>
-            <a:r>
-              <a:rPr lang="de-DE" baseline="0" dirty="0" err="1">
-                <a:sym typeface="Wingdings" panose="05000000000000000000" pitchFamily="2" charset="2"/>
-              </a:rPr>
-              <a:t>BlockReward</a:t>
-            </a:r>
-            <a:r>
-              <a:rPr lang="de-DE" baseline="0">
-                <a:sym typeface="Wingdings" panose="05000000000000000000" pitchFamily="2" charset="2"/>
-              </a:rPr>
-              <a:t> (?)</a:t>
-            </a:r>
-            <a:endParaRPr lang="de-DE" baseline="0" dirty="0">
-              <a:sym typeface="Wingdings" panose="05000000000000000000" pitchFamily="2" charset="2"/>
-            </a:endParaRPr>
-          </a:p>
-          <a:p>
-            <a:pPr marL="457200" indent="-298450">
-              <a:buFont typeface="Symbol" panose="05050102010706020507" pitchFamily="18" charset="2"/>
-              <a:buChar char="-"/>
-            </a:pPr>
-            <a:endParaRPr lang="de-DE" baseline="0" dirty="0">
-              <a:sym typeface="Wingdings" panose="05000000000000000000" pitchFamily="2" charset="2"/>
-            </a:endParaRPr>
           </a:p>
         </p:txBody>
       </p:sp>
     </p:spTree>
     <p:extLst>
       <p:ext uri="{BB962C8B-B14F-4D97-AF65-F5344CB8AC3E}">
-        <p14:creationId xmlns:p14="http://schemas.microsoft.com/office/powerpoint/2010/main" val="442979678"/>
+        <p14:creationId xmlns:p14="http://schemas.microsoft.com/office/powerpoint/2010/main" val="1641863781"/>
       </p:ext>
     </p:extLst>
   </p:cSld>
@@ -1714,171 +902,6 @@
 </file>
 
 <file path=ppt/notesSlides/notesSlide5.xml><?xml version="1.0" encoding="utf-8"?>
-<p:notes xmlns:a="http://schemas.openxmlformats.org/drawingml/2006/main" xmlns:r="http://schemas.openxmlformats.org/officeDocument/2006/relationships" xmlns:p="http://schemas.openxmlformats.org/presentationml/2006/main" showMasterSp="0" showMasterPhAnim="0">
-  <p:cSld>
-    <p:spTree>
-      <p:nvGrpSpPr>
-        <p:cNvPr id="1" name="Shape 102"/>
-        <p:cNvGrpSpPr/>
-        <p:nvPr/>
-      </p:nvGrpSpPr>
-      <p:grpSpPr>
-        <a:xfrm>
-          <a:off x="0" y="0"/>
-          <a:ext cx="0" cy="0"/>
-          <a:chOff x="0" y="0"/>
-          <a:chExt cx="0" cy="0"/>
-        </a:xfrm>
-      </p:grpSpPr>
-      <p:sp>
-        <p:nvSpPr>
-          <p:cNvPr id="103" name="Google Shape;103;g56a8908bc3_9_0:notes"/>
-          <p:cNvSpPr>
-            <a:spLocks noGrp="1" noRot="1" noChangeAspect="1"/>
-          </p:cNvSpPr>
-          <p:nvPr>
-            <p:ph type="sldImg" idx="2"/>
-          </p:nvPr>
-        </p:nvSpPr>
-        <p:spPr>
-          <a:xfrm>
-            <a:off x="381000" y="685800"/>
-            <a:ext cx="6096000" cy="3429000"/>
-          </a:xfrm>
-          <a:custGeom>
-            <a:avLst/>
-            <a:gdLst/>
-            <a:ahLst/>
-            <a:cxnLst/>
-            <a:rect l="l" t="t" r="r" b="b"/>
-            <a:pathLst>
-              <a:path w="120000" h="120000" extrusionOk="0">
-                <a:moveTo>
-                  <a:pt x="0" y="0"/>
-                </a:moveTo>
-                <a:lnTo>
-                  <a:pt x="120000" y="0"/>
-                </a:lnTo>
-                <a:lnTo>
-                  <a:pt x="120000" y="120000"/>
-                </a:lnTo>
-                <a:lnTo>
-                  <a:pt x="0" y="120000"/>
-                </a:lnTo>
-                <a:close/>
-              </a:path>
-            </a:pathLst>
-          </a:custGeom>
-        </p:spPr>
-      </p:sp>
-      <p:sp>
-        <p:nvSpPr>
-          <p:cNvPr id="104" name="Google Shape;104;g56a8908bc3_9_0:notes"/>
-          <p:cNvSpPr txBox="1">
-            <a:spLocks noGrp="1"/>
-          </p:cNvSpPr>
-          <p:nvPr>
-            <p:ph type="body" idx="1"/>
-          </p:nvPr>
-        </p:nvSpPr>
-        <p:spPr>
-          <a:xfrm>
-            <a:off x="685800" y="4343400"/>
-            <a:ext cx="5486400" cy="4114800"/>
-          </a:xfrm>
-          <a:prstGeom prst="rect">
-            <a:avLst/>
-          </a:prstGeom>
-        </p:spPr>
-        <p:txBody>
-          <a:bodyPr spcFirstLastPara="1" wrap="square" lIns="91425" tIns="91425" rIns="91425" bIns="91425" anchor="t" anchorCtr="0">
-            <a:noAutofit/>
-          </a:bodyPr>
-          <a:lstStyle/>
-          <a:p>
-            <a:pPr marL="457200" lvl="0" indent="-298450" algn="l" rtl="0">
-              <a:spcBef>
-                <a:spcPts val="0"/>
-              </a:spcBef>
-              <a:spcAft>
-                <a:spcPts val="0"/>
-              </a:spcAft>
-              <a:buSzPts val="1100"/>
-              <a:buChar char="-"/>
-            </a:pPr>
-            <a:r>
-              <a:rPr lang="en"/>
-              <a:t>Where is sensor data stored?</a:t>
-            </a:r>
-            <a:endParaRPr/>
-          </a:p>
-          <a:p>
-            <a:pPr marL="457200" lvl="0" indent="-298450" algn="l" rtl="0">
-              <a:spcBef>
-                <a:spcPts val="0"/>
-              </a:spcBef>
-              <a:spcAft>
-                <a:spcPts val="0"/>
-              </a:spcAft>
-              <a:buSzPts val="1100"/>
-              <a:buChar char="-"/>
-            </a:pPr>
-            <a:r>
-              <a:rPr lang="en"/>
-              <a:t>Why proof of wokr? -&gt; Don't forget to mention</a:t>
-            </a:r>
-            <a:endParaRPr/>
-          </a:p>
-          <a:p>
-            <a:pPr marL="457200" lvl="0" indent="-298450" algn="l" rtl="0">
-              <a:spcBef>
-                <a:spcPts val="0"/>
-              </a:spcBef>
-              <a:spcAft>
-                <a:spcPts val="0"/>
-              </a:spcAft>
-              <a:buSzPts val="1100"/>
-              <a:buChar char="-"/>
-            </a:pPr>
-            <a:r>
-              <a:rPr lang="en"/>
-              <a:t>Simpler stack prefered</a:t>
-            </a:r>
-            <a:endParaRPr/>
-          </a:p>
-          <a:p>
-            <a:pPr marL="457200" lvl="0" indent="-298450" algn="l" rtl="0">
-              <a:spcBef>
-                <a:spcPts val="0"/>
-              </a:spcBef>
-              <a:spcAft>
-                <a:spcPts val="0"/>
-              </a:spcAft>
-              <a:buSzPts val="1100"/>
-              <a:buChar char="-"/>
-            </a:pPr>
-            <a:r>
-              <a:rPr lang="en"/>
-              <a:t>Test workflow ...Before commiting to it </a:t>
-            </a:r>
-            <a:endParaRPr/>
-          </a:p>
-        </p:txBody>
-      </p:sp>
-    </p:spTree>
-    <p:extLst>
-      <p:ext uri="{BB962C8B-B14F-4D97-AF65-F5344CB8AC3E}">
-        <p14:creationId xmlns:p14="http://schemas.microsoft.com/office/powerpoint/2010/main" val="1330241130"/>
-      </p:ext>
-    </p:extLst>
-  </p:cSld>
-  <p:clrMapOvr>
-    <a:masterClrMapping/>
-  </p:clrMapOvr>
-</p:notes>
-</file>
-
-<file path=ppt/notesSlides/notesSlide6.xml><?xml version="1.0" encoding="utf-8"?>
 <p:notes xmlns:a="http://schemas.openxmlformats.org/drawingml/2006/main" xmlns:r="http://schemas.openxmlformats.org/officeDocument/2006/relationships" xmlns:p="http://schemas.openxmlformats.org/presentationml/2006/main">
   <p:cSld>
     <p:spTree>
@@ -1911,133 +934,6 @@
             <a:ext cx="6096000" cy="3429000"/>
           </a:xfrm>
         </p:spPr>
-      </p:sp>
-      <p:sp>
-        <p:nvSpPr>
-          <p:cNvPr id="3" name="Notizenplatzhalter 2"/>
-          <p:cNvSpPr>
-            <a:spLocks noGrp="1"/>
-          </p:cNvSpPr>
-          <p:nvPr>
-            <p:ph type="body" idx="1"/>
-          </p:nvPr>
-        </p:nvSpPr>
-        <p:spPr/>
-        <p:txBody>
-          <a:bodyPr/>
-          <a:lstStyle/>
-          <a:p>
-            <a:endParaRPr lang="de-DE" dirty="0"/>
-          </a:p>
-        </p:txBody>
-      </p:sp>
-    </p:spTree>
-    <p:extLst>
-      <p:ext uri="{BB962C8B-B14F-4D97-AF65-F5344CB8AC3E}">
-        <p14:creationId xmlns:p14="http://schemas.microsoft.com/office/powerpoint/2010/main" val="2510380856"/>
-      </p:ext>
-    </p:extLst>
-  </p:cSld>
-  <p:clrMapOvr>
-    <a:masterClrMapping/>
-  </p:clrMapOvr>
-</p:notes>
-</file>
-
-<file path=ppt/notesSlides/notesSlide7.xml><?xml version="1.0" encoding="utf-8"?>
-<p:notes xmlns:a="http://schemas.openxmlformats.org/drawingml/2006/main" xmlns:r="http://schemas.openxmlformats.org/officeDocument/2006/relationships" xmlns:p="http://schemas.openxmlformats.org/presentationml/2006/main">
-  <p:cSld>
-    <p:spTree>
-      <p:nvGrpSpPr>
-        <p:cNvPr id="1" name=""/>
-        <p:cNvGrpSpPr/>
-        <p:nvPr/>
-      </p:nvGrpSpPr>
-      <p:grpSpPr>
-        <a:xfrm>
-          <a:off x="0" y="0"/>
-          <a:ext cx="0" cy="0"/>
-          <a:chOff x="0" y="0"/>
-          <a:chExt cx="0" cy="0"/>
-        </a:xfrm>
-      </p:grpSpPr>
-      <p:sp>
-        <p:nvSpPr>
-          <p:cNvPr id="2" name="Folienbildplatzhalter 1"/>
-          <p:cNvSpPr>
-            <a:spLocks noGrp="1" noRot="1" noChangeAspect="1"/>
-          </p:cNvSpPr>
-          <p:nvPr>
-            <p:ph type="sldImg"/>
-          </p:nvPr>
-        </p:nvSpPr>
-        <p:spPr>
-          <a:xfrm>
-            <a:off x="381000" y="685800"/>
-            <a:ext cx="6096000" cy="3429000"/>
-          </a:xfrm>
-        </p:spPr>
-      </p:sp>
-      <p:sp>
-        <p:nvSpPr>
-          <p:cNvPr id="3" name="Notizenplatzhalter 2"/>
-          <p:cNvSpPr>
-            <a:spLocks noGrp="1"/>
-          </p:cNvSpPr>
-          <p:nvPr>
-            <p:ph type="body" idx="1"/>
-          </p:nvPr>
-        </p:nvSpPr>
-        <p:spPr/>
-        <p:txBody>
-          <a:bodyPr/>
-          <a:lstStyle/>
-          <a:p>
-            <a:endParaRPr lang="de-DE" dirty="0"/>
-          </a:p>
-        </p:txBody>
-      </p:sp>
-    </p:spTree>
-    <p:extLst>
-      <p:ext uri="{BB962C8B-B14F-4D97-AF65-F5344CB8AC3E}">
-        <p14:creationId xmlns:p14="http://schemas.microsoft.com/office/powerpoint/2010/main" val="1641863781"/>
-      </p:ext>
-    </p:extLst>
-  </p:cSld>
-  <p:clrMapOvr>
-    <a:masterClrMapping/>
-  </p:clrMapOvr>
-</p:notes>
-</file>
-
-<file path=ppt/notesSlides/notesSlide8.xml><?xml version="1.0" encoding="utf-8"?>
-<p:notes xmlns:a="http://schemas.openxmlformats.org/drawingml/2006/main" xmlns:r="http://schemas.openxmlformats.org/officeDocument/2006/relationships" xmlns:p="http://schemas.openxmlformats.org/presentationml/2006/main">
-  <p:cSld>
-    <p:spTree>
-      <p:nvGrpSpPr>
-        <p:cNvPr id="1" name=""/>
-        <p:cNvGrpSpPr/>
-        <p:nvPr/>
-      </p:nvGrpSpPr>
-      <p:grpSpPr>
-        <a:xfrm>
-          <a:off x="0" y="0"/>
-          <a:ext cx="0" cy="0"/>
-          <a:chOff x="0" y="0"/>
-          <a:chExt cx="0" cy="0"/>
-        </a:xfrm>
-      </p:grpSpPr>
-      <p:sp>
-        <p:nvSpPr>
-          <p:cNvPr id="2" name="Folienbildplatzhalter 1"/>
-          <p:cNvSpPr>
-            <a:spLocks noGrp="1" noRot="1" noChangeAspect="1"/>
-          </p:cNvSpPr>
-          <p:nvPr>
-            <p:ph type="sldImg"/>
-          </p:nvPr>
-        </p:nvSpPr>
-        <p:spPr/>
       </p:sp>
       <p:sp>
         <p:nvSpPr>
@@ -2093,7 +989,7 @@
           <p:cNvPr id="2" name="Titel 1">
             <a:extLst>
               <a:ext uri="{FF2B5EF4-FFF2-40B4-BE49-F238E27FC236}">
-                <a16:creationId xmlns:a16="http://schemas.microsoft.com/office/drawing/2014/main" id="{C4BFC7AA-CD3C-4EB3-8AC5-BEB0EBFA9096}"/>
+                <a16:creationId xmlns:a16="http://schemas.microsoft.com/office/drawing/2014/main" xmlns="" id="{C4BFC7AA-CD3C-4EB3-8AC5-BEB0EBFA9096}"/>
               </a:ext>
             </a:extLst>
           </p:cNvPr>
@@ -2130,7 +1026,7 @@
           <p:cNvPr id="3" name="Untertitel 2">
             <a:extLst>
               <a:ext uri="{FF2B5EF4-FFF2-40B4-BE49-F238E27FC236}">
-                <a16:creationId xmlns:a16="http://schemas.microsoft.com/office/drawing/2014/main" id="{1219FD26-0274-41D1-9EB8-E209567E96B7}"/>
+                <a16:creationId xmlns:a16="http://schemas.microsoft.com/office/drawing/2014/main" xmlns="" id="{1219FD26-0274-41D1-9EB8-E209567E96B7}"/>
               </a:ext>
             </a:extLst>
           </p:cNvPr>
@@ -2200,7 +1096,7 @@
           <p:cNvPr id="4" name="Datumsplatzhalter 3">
             <a:extLst>
               <a:ext uri="{FF2B5EF4-FFF2-40B4-BE49-F238E27FC236}">
-                <a16:creationId xmlns:a16="http://schemas.microsoft.com/office/drawing/2014/main" id="{E7880DE4-D78F-46C4-97A5-D83B697BB518}"/>
+                <a16:creationId xmlns:a16="http://schemas.microsoft.com/office/drawing/2014/main" xmlns="" id="{E7880DE4-D78F-46C4-97A5-D83B697BB518}"/>
               </a:ext>
             </a:extLst>
           </p:cNvPr>
@@ -2218,7 +1114,7 @@
           <a:p>
             <a:fld id="{24483E84-0737-48BA-B7F0-9EA11BFDC565}" type="datetimeFigureOut">
               <a:rPr lang="de-DE" smtClean="0"/>
-              <a:t>21.05.2019</a:t>
+              <a:t>22.05.2019</a:t>
             </a:fld>
             <a:endParaRPr lang="de-DE"/>
           </a:p>
@@ -2229,7 +1125,7 @@
           <p:cNvPr id="5" name="Fußzeilenplatzhalter 4">
             <a:extLst>
               <a:ext uri="{FF2B5EF4-FFF2-40B4-BE49-F238E27FC236}">
-                <a16:creationId xmlns:a16="http://schemas.microsoft.com/office/drawing/2014/main" id="{11036CC6-A794-440F-8F05-C516B6142220}"/>
+                <a16:creationId xmlns:a16="http://schemas.microsoft.com/office/drawing/2014/main" xmlns="" id="{11036CC6-A794-440F-8F05-C516B6142220}"/>
               </a:ext>
             </a:extLst>
           </p:cNvPr>
@@ -2254,7 +1150,7 @@
           <p:cNvPr id="6" name="Foliennummernplatzhalter 5">
             <a:extLst>
               <a:ext uri="{FF2B5EF4-FFF2-40B4-BE49-F238E27FC236}">
-                <a16:creationId xmlns:a16="http://schemas.microsoft.com/office/drawing/2014/main" id="{6BA7CC04-CD79-45EF-9AF1-056EC217621C}"/>
+                <a16:creationId xmlns:a16="http://schemas.microsoft.com/office/drawing/2014/main" xmlns="" id="{6BA7CC04-CD79-45EF-9AF1-056EC217621C}"/>
               </a:ext>
             </a:extLst>
           </p:cNvPr>
@@ -2323,7 +1219,7 @@
           <p:cNvPr id="2" name="Titel 1">
             <a:extLst>
               <a:ext uri="{FF2B5EF4-FFF2-40B4-BE49-F238E27FC236}">
-                <a16:creationId xmlns:a16="http://schemas.microsoft.com/office/drawing/2014/main" id="{29CB0ABE-8E7B-4FC1-B4FA-BA3BE35CF312}"/>
+                <a16:creationId xmlns:a16="http://schemas.microsoft.com/office/drawing/2014/main" xmlns="" id="{29CB0ABE-8E7B-4FC1-B4FA-BA3BE35CF312}"/>
               </a:ext>
             </a:extLst>
           </p:cNvPr>
@@ -2351,7 +1247,7 @@
           <p:cNvPr id="3" name="Vertikaler Textplatzhalter 2">
             <a:extLst>
               <a:ext uri="{FF2B5EF4-FFF2-40B4-BE49-F238E27FC236}">
-                <a16:creationId xmlns:a16="http://schemas.microsoft.com/office/drawing/2014/main" id="{4CEAE241-6927-4286-A74A-B86C81B3776A}"/>
+                <a16:creationId xmlns:a16="http://schemas.microsoft.com/office/drawing/2014/main" xmlns="" id="{4CEAE241-6927-4286-A74A-B86C81B3776A}"/>
               </a:ext>
             </a:extLst>
           </p:cNvPr>
@@ -2408,7 +1304,7 @@
           <p:cNvPr id="4" name="Datumsplatzhalter 3">
             <a:extLst>
               <a:ext uri="{FF2B5EF4-FFF2-40B4-BE49-F238E27FC236}">
-                <a16:creationId xmlns:a16="http://schemas.microsoft.com/office/drawing/2014/main" id="{3D64C755-8B16-4EFE-ACEE-1F767B8FC3CD}"/>
+                <a16:creationId xmlns:a16="http://schemas.microsoft.com/office/drawing/2014/main" xmlns="" id="{3D64C755-8B16-4EFE-ACEE-1F767B8FC3CD}"/>
               </a:ext>
             </a:extLst>
           </p:cNvPr>
@@ -2426,7 +1322,7 @@
           <a:p>
             <a:fld id="{24483E84-0737-48BA-B7F0-9EA11BFDC565}" type="datetimeFigureOut">
               <a:rPr lang="de-DE" smtClean="0"/>
-              <a:t>21.05.2019</a:t>
+              <a:t>22.05.2019</a:t>
             </a:fld>
             <a:endParaRPr lang="de-DE"/>
           </a:p>
@@ -2437,7 +1333,7 @@
           <p:cNvPr id="5" name="Fußzeilenplatzhalter 4">
             <a:extLst>
               <a:ext uri="{FF2B5EF4-FFF2-40B4-BE49-F238E27FC236}">
-                <a16:creationId xmlns:a16="http://schemas.microsoft.com/office/drawing/2014/main" id="{D5D518B2-A8E9-453E-95A0-9659017CC8C7}"/>
+                <a16:creationId xmlns:a16="http://schemas.microsoft.com/office/drawing/2014/main" xmlns="" id="{D5D518B2-A8E9-453E-95A0-9659017CC8C7}"/>
               </a:ext>
             </a:extLst>
           </p:cNvPr>
@@ -2462,7 +1358,7 @@
           <p:cNvPr id="6" name="Foliennummernplatzhalter 5">
             <a:extLst>
               <a:ext uri="{FF2B5EF4-FFF2-40B4-BE49-F238E27FC236}">
-                <a16:creationId xmlns:a16="http://schemas.microsoft.com/office/drawing/2014/main" id="{92CED5AE-CEB3-4CBB-AA0B-966C92EA750A}"/>
+                <a16:creationId xmlns:a16="http://schemas.microsoft.com/office/drawing/2014/main" xmlns="" id="{92CED5AE-CEB3-4CBB-AA0B-966C92EA750A}"/>
               </a:ext>
             </a:extLst>
           </p:cNvPr>
@@ -2531,7 +1427,7 @@
           <p:cNvPr id="2" name="Vertikaler Titel 1">
             <a:extLst>
               <a:ext uri="{FF2B5EF4-FFF2-40B4-BE49-F238E27FC236}">
-                <a16:creationId xmlns:a16="http://schemas.microsoft.com/office/drawing/2014/main" id="{451E92A8-7314-428F-A26E-23CF746CDCCE}"/>
+                <a16:creationId xmlns:a16="http://schemas.microsoft.com/office/drawing/2014/main" xmlns="" id="{451E92A8-7314-428F-A26E-23CF746CDCCE}"/>
               </a:ext>
             </a:extLst>
           </p:cNvPr>
@@ -2564,7 +1460,7 @@
           <p:cNvPr id="3" name="Vertikaler Textplatzhalter 2">
             <a:extLst>
               <a:ext uri="{FF2B5EF4-FFF2-40B4-BE49-F238E27FC236}">
-                <a16:creationId xmlns:a16="http://schemas.microsoft.com/office/drawing/2014/main" id="{D104BF60-A350-4203-9847-808CB5EA0429}"/>
+                <a16:creationId xmlns:a16="http://schemas.microsoft.com/office/drawing/2014/main" xmlns="" id="{D104BF60-A350-4203-9847-808CB5EA0429}"/>
               </a:ext>
             </a:extLst>
           </p:cNvPr>
@@ -2626,7 +1522,7 @@
           <p:cNvPr id="4" name="Datumsplatzhalter 3">
             <a:extLst>
               <a:ext uri="{FF2B5EF4-FFF2-40B4-BE49-F238E27FC236}">
-                <a16:creationId xmlns:a16="http://schemas.microsoft.com/office/drawing/2014/main" id="{4540AF17-A276-4956-8F59-E1AA84839DDC}"/>
+                <a16:creationId xmlns:a16="http://schemas.microsoft.com/office/drawing/2014/main" xmlns="" id="{4540AF17-A276-4956-8F59-E1AA84839DDC}"/>
               </a:ext>
             </a:extLst>
           </p:cNvPr>
@@ -2644,7 +1540,7 @@
           <a:p>
             <a:fld id="{24483E84-0737-48BA-B7F0-9EA11BFDC565}" type="datetimeFigureOut">
               <a:rPr lang="de-DE" smtClean="0"/>
-              <a:t>21.05.2019</a:t>
+              <a:t>22.05.2019</a:t>
             </a:fld>
             <a:endParaRPr lang="de-DE"/>
           </a:p>
@@ -2655,7 +1551,7 @@
           <p:cNvPr id="5" name="Fußzeilenplatzhalter 4">
             <a:extLst>
               <a:ext uri="{FF2B5EF4-FFF2-40B4-BE49-F238E27FC236}">
-                <a16:creationId xmlns:a16="http://schemas.microsoft.com/office/drawing/2014/main" id="{3C7473DD-11FB-4D57-8FC1-8CADB995E084}"/>
+                <a16:creationId xmlns:a16="http://schemas.microsoft.com/office/drawing/2014/main" xmlns="" id="{3C7473DD-11FB-4D57-8FC1-8CADB995E084}"/>
               </a:ext>
             </a:extLst>
           </p:cNvPr>
@@ -2680,7 +1576,7 @@
           <p:cNvPr id="6" name="Foliennummernplatzhalter 5">
             <a:extLst>
               <a:ext uri="{FF2B5EF4-FFF2-40B4-BE49-F238E27FC236}">
-                <a16:creationId xmlns:a16="http://schemas.microsoft.com/office/drawing/2014/main" id="{541BDCD7-2760-4AFA-8E6E-47340FF1A784}"/>
+                <a16:creationId xmlns:a16="http://schemas.microsoft.com/office/drawing/2014/main" xmlns="" id="{541BDCD7-2760-4AFA-8E6E-47340FF1A784}"/>
               </a:ext>
             </a:extLst>
           </p:cNvPr>
@@ -3112,7 +2008,7 @@
           <p:cNvPr id="2" name="Titel 1">
             <a:extLst>
               <a:ext uri="{FF2B5EF4-FFF2-40B4-BE49-F238E27FC236}">
-                <a16:creationId xmlns:a16="http://schemas.microsoft.com/office/drawing/2014/main" id="{73E059B5-3B08-45D2-93D0-258C20938E0B}"/>
+                <a16:creationId xmlns:a16="http://schemas.microsoft.com/office/drawing/2014/main" xmlns="" id="{73E059B5-3B08-45D2-93D0-258C20938E0B}"/>
               </a:ext>
             </a:extLst>
           </p:cNvPr>
@@ -3140,7 +2036,7 @@
           <p:cNvPr id="3" name="Inhaltsplatzhalter 2">
             <a:extLst>
               <a:ext uri="{FF2B5EF4-FFF2-40B4-BE49-F238E27FC236}">
-                <a16:creationId xmlns:a16="http://schemas.microsoft.com/office/drawing/2014/main" id="{9FD5C0EA-0400-451C-B209-1265564A2B90}"/>
+                <a16:creationId xmlns:a16="http://schemas.microsoft.com/office/drawing/2014/main" xmlns="" id="{9FD5C0EA-0400-451C-B209-1265564A2B90}"/>
               </a:ext>
             </a:extLst>
           </p:cNvPr>
@@ -3197,7 +2093,7 @@
           <p:cNvPr id="4" name="Datumsplatzhalter 3">
             <a:extLst>
               <a:ext uri="{FF2B5EF4-FFF2-40B4-BE49-F238E27FC236}">
-                <a16:creationId xmlns:a16="http://schemas.microsoft.com/office/drawing/2014/main" id="{C7E7697B-116D-4B0D-B992-AE8B5F433116}"/>
+                <a16:creationId xmlns:a16="http://schemas.microsoft.com/office/drawing/2014/main" xmlns="" id="{C7E7697B-116D-4B0D-B992-AE8B5F433116}"/>
               </a:ext>
             </a:extLst>
           </p:cNvPr>
@@ -3215,7 +2111,7 @@
           <a:p>
             <a:fld id="{24483E84-0737-48BA-B7F0-9EA11BFDC565}" type="datetimeFigureOut">
               <a:rPr lang="de-DE" smtClean="0"/>
-              <a:t>21.05.2019</a:t>
+              <a:t>22.05.2019</a:t>
             </a:fld>
             <a:endParaRPr lang="de-DE"/>
           </a:p>
@@ -3226,7 +2122,7 @@
           <p:cNvPr id="5" name="Fußzeilenplatzhalter 4">
             <a:extLst>
               <a:ext uri="{FF2B5EF4-FFF2-40B4-BE49-F238E27FC236}">
-                <a16:creationId xmlns:a16="http://schemas.microsoft.com/office/drawing/2014/main" id="{51517F04-B3C2-4E2D-BB21-FC164E24CACD}"/>
+                <a16:creationId xmlns:a16="http://schemas.microsoft.com/office/drawing/2014/main" xmlns="" id="{51517F04-B3C2-4E2D-BB21-FC164E24CACD}"/>
               </a:ext>
             </a:extLst>
           </p:cNvPr>
@@ -3251,7 +2147,7 @@
           <p:cNvPr id="6" name="Foliennummernplatzhalter 5">
             <a:extLst>
               <a:ext uri="{FF2B5EF4-FFF2-40B4-BE49-F238E27FC236}">
-                <a16:creationId xmlns:a16="http://schemas.microsoft.com/office/drawing/2014/main" id="{8B32C0DC-F2F4-4E00-A326-2216FD6D9BF6}"/>
+                <a16:creationId xmlns:a16="http://schemas.microsoft.com/office/drawing/2014/main" xmlns="" id="{8B32C0DC-F2F4-4E00-A326-2216FD6D9BF6}"/>
               </a:ext>
             </a:extLst>
           </p:cNvPr>
@@ -3320,7 +2216,7 @@
           <p:cNvPr id="2" name="Titel 1">
             <a:extLst>
               <a:ext uri="{FF2B5EF4-FFF2-40B4-BE49-F238E27FC236}">
-                <a16:creationId xmlns:a16="http://schemas.microsoft.com/office/drawing/2014/main" id="{F2A058CB-DF78-4138-B3BF-B8D28329DAFD}"/>
+                <a16:creationId xmlns:a16="http://schemas.microsoft.com/office/drawing/2014/main" xmlns="" id="{F2A058CB-DF78-4138-B3BF-B8D28329DAFD}"/>
               </a:ext>
             </a:extLst>
           </p:cNvPr>
@@ -3357,7 +2253,7 @@
           <p:cNvPr id="3" name="Textplatzhalter 2">
             <a:extLst>
               <a:ext uri="{FF2B5EF4-FFF2-40B4-BE49-F238E27FC236}">
-                <a16:creationId xmlns:a16="http://schemas.microsoft.com/office/drawing/2014/main" id="{F60F13CE-CAF1-460D-B0DB-4ECD497D06AE}"/>
+                <a16:creationId xmlns:a16="http://schemas.microsoft.com/office/drawing/2014/main" xmlns="" id="{F60F13CE-CAF1-460D-B0DB-4ECD497D06AE}"/>
               </a:ext>
             </a:extLst>
           </p:cNvPr>
@@ -3482,7 +2378,7 @@
           <p:cNvPr id="4" name="Datumsplatzhalter 3">
             <a:extLst>
               <a:ext uri="{FF2B5EF4-FFF2-40B4-BE49-F238E27FC236}">
-                <a16:creationId xmlns:a16="http://schemas.microsoft.com/office/drawing/2014/main" id="{D1E4E82D-736D-48A5-A8EF-23543A7FE690}"/>
+                <a16:creationId xmlns:a16="http://schemas.microsoft.com/office/drawing/2014/main" xmlns="" id="{D1E4E82D-736D-48A5-A8EF-23543A7FE690}"/>
               </a:ext>
             </a:extLst>
           </p:cNvPr>
@@ -3500,7 +2396,7 @@
           <a:p>
             <a:fld id="{24483E84-0737-48BA-B7F0-9EA11BFDC565}" type="datetimeFigureOut">
               <a:rPr lang="de-DE" smtClean="0"/>
-              <a:t>21.05.2019</a:t>
+              <a:t>22.05.2019</a:t>
             </a:fld>
             <a:endParaRPr lang="de-DE"/>
           </a:p>
@@ -3511,7 +2407,7 @@
           <p:cNvPr id="5" name="Fußzeilenplatzhalter 4">
             <a:extLst>
               <a:ext uri="{FF2B5EF4-FFF2-40B4-BE49-F238E27FC236}">
-                <a16:creationId xmlns:a16="http://schemas.microsoft.com/office/drawing/2014/main" id="{C6D7CC20-C8FE-4259-8C82-3CAD9CDB3325}"/>
+                <a16:creationId xmlns:a16="http://schemas.microsoft.com/office/drawing/2014/main" xmlns="" id="{C6D7CC20-C8FE-4259-8C82-3CAD9CDB3325}"/>
               </a:ext>
             </a:extLst>
           </p:cNvPr>
@@ -3536,7 +2432,7 @@
           <p:cNvPr id="6" name="Foliennummernplatzhalter 5">
             <a:extLst>
               <a:ext uri="{FF2B5EF4-FFF2-40B4-BE49-F238E27FC236}">
-                <a16:creationId xmlns:a16="http://schemas.microsoft.com/office/drawing/2014/main" id="{72C04CDF-3080-4CCC-92A2-7E82D8734547}"/>
+                <a16:creationId xmlns:a16="http://schemas.microsoft.com/office/drawing/2014/main" xmlns="" id="{72C04CDF-3080-4CCC-92A2-7E82D8734547}"/>
               </a:ext>
             </a:extLst>
           </p:cNvPr>
@@ -3605,7 +2501,7 @@
           <p:cNvPr id="2" name="Titel 1">
             <a:extLst>
               <a:ext uri="{FF2B5EF4-FFF2-40B4-BE49-F238E27FC236}">
-                <a16:creationId xmlns:a16="http://schemas.microsoft.com/office/drawing/2014/main" id="{E74F524F-1542-4C74-A000-B2B840B20F0E}"/>
+                <a16:creationId xmlns:a16="http://schemas.microsoft.com/office/drawing/2014/main" xmlns="" id="{E74F524F-1542-4C74-A000-B2B840B20F0E}"/>
               </a:ext>
             </a:extLst>
           </p:cNvPr>
@@ -3633,7 +2529,7 @@
           <p:cNvPr id="3" name="Inhaltsplatzhalter 2">
             <a:extLst>
               <a:ext uri="{FF2B5EF4-FFF2-40B4-BE49-F238E27FC236}">
-                <a16:creationId xmlns:a16="http://schemas.microsoft.com/office/drawing/2014/main" id="{37172C96-4414-40C7-B661-F62818991DA0}"/>
+                <a16:creationId xmlns:a16="http://schemas.microsoft.com/office/drawing/2014/main" xmlns="" id="{37172C96-4414-40C7-B661-F62818991DA0}"/>
               </a:ext>
             </a:extLst>
           </p:cNvPr>
@@ -3695,7 +2591,7 @@
           <p:cNvPr id="4" name="Inhaltsplatzhalter 3">
             <a:extLst>
               <a:ext uri="{FF2B5EF4-FFF2-40B4-BE49-F238E27FC236}">
-                <a16:creationId xmlns:a16="http://schemas.microsoft.com/office/drawing/2014/main" id="{B9FA087B-DF70-4FF4-9BF0-81680FC488C6}"/>
+                <a16:creationId xmlns:a16="http://schemas.microsoft.com/office/drawing/2014/main" xmlns="" id="{B9FA087B-DF70-4FF4-9BF0-81680FC488C6}"/>
               </a:ext>
             </a:extLst>
           </p:cNvPr>
@@ -3757,7 +2653,7 @@
           <p:cNvPr id="5" name="Datumsplatzhalter 4">
             <a:extLst>
               <a:ext uri="{FF2B5EF4-FFF2-40B4-BE49-F238E27FC236}">
-                <a16:creationId xmlns:a16="http://schemas.microsoft.com/office/drawing/2014/main" id="{8CF348FF-578B-4739-9FD5-648C9207D23F}"/>
+                <a16:creationId xmlns:a16="http://schemas.microsoft.com/office/drawing/2014/main" xmlns="" id="{8CF348FF-578B-4739-9FD5-648C9207D23F}"/>
               </a:ext>
             </a:extLst>
           </p:cNvPr>
@@ -3775,7 +2671,7 @@
           <a:p>
             <a:fld id="{24483E84-0737-48BA-B7F0-9EA11BFDC565}" type="datetimeFigureOut">
               <a:rPr lang="de-DE" smtClean="0"/>
-              <a:t>21.05.2019</a:t>
+              <a:t>22.05.2019</a:t>
             </a:fld>
             <a:endParaRPr lang="de-DE"/>
           </a:p>
@@ -3786,7 +2682,7 @@
           <p:cNvPr id="6" name="Fußzeilenplatzhalter 5">
             <a:extLst>
               <a:ext uri="{FF2B5EF4-FFF2-40B4-BE49-F238E27FC236}">
-                <a16:creationId xmlns:a16="http://schemas.microsoft.com/office/drawing/2014/main" id="{E819008B-424F-4665-8385-8B010014887C}"/>
+                <a16:creationId xmlns:a16="http://schemas.microsoft.com/office/drawing/2014/main" xmlns="" id="{E819008B-424F-4665-8385-8B010014887C}"/>
               </a:ext>
             </a:extLst>
           </p:cNvPr>
@@ -3811,7 +2707,7 @@
           <p:cNvPr id="7" name="Foliennummernplatzhalter 6">
             <a:extLst>
               <a:ext uri="{FF2B5EF4-FFF2-40B4-BE49-F238E27FC236}">
-                <a16:creationId xmlns:a16="http://schemas.microsoft.com/office/drawing/2014/main" id="{19083DF4-3A71-4908-9619-9CEA5710B066}"/>
+                <a16:creationId xmlns:a16="http://schemas.microsoft.com/office/drawing/2014/main" xmlns="" id="{19083DF4-3A71-4908-9619-9CEA5710B066}"/>
               </a:ext>
             </a:extLst>
           </p:cNvPr>
@@ -3880,7 +2776,7 @@
           <p:cNvPr id="2" name="Titel 1">
             <a:extLst>
               <a:ext uri="{FF2B5EF4-FFF2-40B4-BE49-F238E27FC236}">
-                <a16:creationId xmlns:a16="http://schemas.microsoft.com/office/drawing/2014/main" id="{900A053E-0B47-402C-9785-6A90187BCE5C}"/>
+                <a16:creationId xmlns:a16="http://schemas.microsoft.com/office/drawing/2014/main" xmlns="" id="{900A053E-0B47-402C-9785-6A90187BCE5C}"/>
               </a:ext>
             </a:extLst>
           </p:cNvPr>
@@ -3913,7 +2809,7 @@
           <p:cNvPr id="3" name="Textplatzhalter 2">
             <a:extLst>
               <a:ext uri="{FF2B5EF4-FFF2-40B4-BE49-F238E27FC236}">
-                <a16:creationId xmlns:a16="http://schemas.microsoft.com/office/drawing/2014/main" id="{2AADE9D6-398E-49D5-8EC9-642A3F2FA0A8}"/>
+                <a16:creationId xmlns:a16="http://schemas.microsoft.com/office/drawing/2014/main" xmlns="" id="{2AADE9D6-398E-49D5-8EC9-642A3F2FA0A8}"/>
               </a:ext>
             </a:extLst>
           </p:cNvPr>
@@ -3984,7 +2880,7 @@
           <p:cNvPr id="4" name="Inhaltsplatzhalter 3">
             <a:extLst>
               <a:ext uri="{FF2B5EF4-FFF2-40B4-BE49-F238E27FC236}">
-                <a16:creationId xmlns:a16="http://schemas.microsoft.com/office/drawing/2014/main" id="{D0FDBCE2-2E7E-43B0-BF19-29F49FB90FD8}"/>
+                <a16:creationId xmlns:a16="http://schemas.microsoft.com/office/drawing/2014/main" xmlns="" id="{D0FDBCE2-2E7E-43B0-BF19-29F49FB90FD8}"/>
               </a:ext>
             </a:extLst>
           </p:cNvPr>
@@ -4046,7 +2942,7 @@
           <p:cNvPr id="5" name="Textplatzhalter 4">
             <a:extLst>
               <a:ext uri="{FF2B5EF4-FFF2-40B4-BE49-F238E27FC236}">
-                <a16:creationId xmlns:a16="http://schemas.microsoft.com/office/drawing/2014/main" id="{1AE2CC6A-7163-40EB-8416-6C05BA311FD4}"/>
+                <a16:creationId xmlns:a16="http://schemas.microsoft.com/office/drawing/2014/main" xmlns="" id="{1AE2CC6A-7163-40EB-8416-6C05BA311FD4}"/>
               </a:ext>
             </a:extLst>
           </p:cNvPr>
@@ -4117,7 +3013,7 @@
           <p:cNvPr id="6" name="Inhaltsplatzhalter 5">
             <a:extLst>
               <a:ext uri="{FF2B5EF4-FFF2-40B4-BE49-F238E27FC236}">
-                <a16:creationId xmlns:a16="http://schemas.microsoft.com/office/drawing/2014/main" id="{071839B5-6AC1-49B3-AEFC-CD01675D8E20}"/>
+                <a16:creationId xmlns:a16="http://schemas.microsoft.com/office/drawing/2014/main" xmlns="" id="{071839B5-6AC1-49B3-AEFC-CD01675D8E20}"/>
               </a:ext>
             </a:extLst>
           </p:cNvPr>
@@ -4179,7 +3075,7 @@
           <p:cNvPr id="7" name="Datumsplatzhalter 6">
             <a:extLst>
               <a:ext uri="{FF2B5EF4-FFF2-40B4-BE49-F238E27FC236}">
-                <a16:creationId xmlns:a16="http://schemas.microsoft.com/office/drawing/2014/main" id="{B729614D-7ECA-4025-90C4-637C08FE6E26}"/>
+                <a16:creationId xmlns:a16="http://schemas.microsoft.com/office/drawing/2014/main" xmlns="" id="{B729614D-7ECA-4025-90C4-637C08FE6E26}"/>
               </a:ext>
             </a:extLst>
           </p:cNvPr>
@@ -4197,7 +3093,7 @@
           <a:p>
             <a:fld id="{24483E84-0737-48BA-B7F0-9EA11BFDC565}" type="datetimeFigureOut">
               <a:rPr lang="de-DE" smtClean="0"/>
-              <a:t>21.05.2019</a:t>
+              <a:t>22.05.2019</a:t>
             </a:fld>
             <a:endParaRPr lang="de-DE"/>
           </a:p>
@@ -4208,7 +3104,7 @@
           <p:cNvPr id="8" name="Fußzeilenplatzhalter 7">
             <a:extLst>
               <a:ext uri="{FF2B5EF4-FFF2-40B4-BE49-F238E27FC236}">
-                <a16:creationId xmlns:a16="http://schemas.microsoft.com/office/drawing/2014/main" id="{F875D342-3531-4CB8-9445-281497440F7B}"/>
+                <a16:creationId xmlns:a16="http://schemas.microsoft.com/office/drawing/2014/main" xmlns="" id="{F875D342-3531-4CB8-9445-281497440F7B}"/>
               </a:ext>
             </a:extLst>
           </p:cNvPr>
@@ -4233,7 +3129,7 @@
           <p:cNvPr id="9" name="Foliennummernplatzhalter 8">
             <a:extLst>
               <a:ext uri="{FF2B5EF4-FFF2-40B4-BE49-F238E27FC236}">
-                <a16:creationId xmlns:a16="http://schemas.microsoft.com/office/drawing/2014/main" id="{9C4BB9B0-DBE1-4274-9784-A84AC15CDFD4}"/>
+                <a16:creationId xmlns:a16="http://schemas.microsoft.com/office/drawing/2014/main" xmlns="" id="{9C4BB9B0-DBE1-4274-9784-A84AC15CDFD4}"/>
               </a:ext>
             </a:extLst>
           </p:cNvPr>
@@ -4302,7 +3198,7 @@
           <p:cNvPr id="2" name="Titel 1">
             <a:extLst>
               <a:ext uri="{FF2B5EF4-FFF2-40B4-BE49-F238E27FC236}">
-                <a16:creationId xmlns:a16="http://schemas.microsoft.com/office/drawing/2014/main" id="{BBA76B00-8355-478E-8AFD-BE5C9EB5FDC2}"/>
+                <a16:creationId xmlns:a16="http://schemas.microsoft.com/office/drawing/2014/main" xmlns="" id="{BBA76B00-8355-478E-8AFD-BE5C9EB5FDC2}"/>
               </a:ext>
             </a:extLst>
           </p:cNvPr>
@@ -4330,7 +3226,7 @@
           <p:cNvPr id="3" name="Datumsplatzhalter 2">
             <a:extLst>
               <a:ext uri="{FF2B5EF4-FFF2-40B4-BE49-F238E27FC236}">
-                <a16:creationId xmlns:a16="http://schemas.microsoft.com/office/drawing/2014/main" id="{0E7CBC94-ACE5-4659-A7A6-9B3F6A7FB352}"/>
+                <a16:creationId xmlns:a16="http://schemas.microsoft.com/office/drawing/2014/main" xmlns="" id="{0E7CBC94-ACE5-4659-A7A6-9B3F6A7FB352}"/>
               </a:ext>
             </a:extLst>
           </p:cNvPr>
@@ -4348,7 +3244,7 @@
           <a:p>
             <a:fld id="{24483E84-0737-48BA-B7F0-9EA11BFDC565}" type="datetimeFigureOut">
               <a:rPr lang="de-DE" smtClean="0"/>
-              <a:t>21.05.2019</a:t>
+              <a:t>22.05.2019</a:t>
             </a:fld>
             <a:endParaRPr lang="de-DE"/>
           </a:p>
@@ -4359,7 +3255,7 @@
           <p:cNvPr id="4" name="Fußzeilenplatzhalter 3">
             <a:extLst>
               <a:ext uri="{FF2B5EF4-FFF2-40B4-BE49-F238E27FC236}">
-                <a16:creationId xmlns:a16="http://schemas.microsoft.com/office/drawing/2014/main" id="{5B2C8211-AB36-4E2F-A466-224E527D5260}"/>
+                <a16:creationId xmlns:a16="http://schemas.microsoft.com/office/drawing/2014/main" xmlns="" id="{5B2C8211-AB36-4E2F-A466-224E527D5260}"/>
               </a:ext>
             </a:extLst>
           </p:cNvPr>
@@ -4384,7 +3280,7 @@
           <p:cNvPr id="5" name="Foliennummernplatzhalter 4">
             <a:extLst>
               <a:ext uri="{FF2B5EF4-FFF2-40B4-BE49-F238E27FC236}">
-                <a16:creationId xmlns:a16="http://schemas.microsoft.com/office/drawing/2014/main" id="{79AC0FFC-BFAC-4A98-8B24-AD86190E6A14}"/>
+                <a16:creationId xmlns:a16="http://schemas.microsoft.com/office/drawing/2014/main" xmlns="" id="{79AC0FFC-BFAC-4A98-8B24-AD86190E6A14}"/>
               </a:ext>
             </a:extLst>
           </p:cNvPr>
@@ -4453,7 +3349,7 @@
           <p:cNvPr id="2" name="Datumsplatzhalter 1">
             <a:extLst>
               <a:ext uri="{FF2B5EF4-FFF2-40B4-BE49-F238E27FC236}">
-                <a16:creationId xmlns:a16="http://schemas.microsoft.com/office/drawing/2014/main" id="{64AA171F-3801-49F8-AEB2-A5D05C3D4161}"/>
+                <a16:creationId xmlns:a16="http://schemas.microsoft.com/office/drawing/2014/main" xmlns="" id="{64AA171F-3801-49F8-AEB2-A5D05C3D4161}"/>
               </a:ext>
             </a:extLst>
           </p:cNvPr>
@@ -4471,7 +3367,7 @@
           <a:p>
             <a:fld id="{24483E84-0737-48BA-B7F0-9EA11BFDC565}" type="datetimeFigureOut">
               <a:rPr lang="de-DE" smtClean="0"/>
-              <a:t>21.05.2019</a:t>
+              <a:t>22.05.2019</a:t>
             </a:fld>
             <a:endParaRPr lang="de-DE"/>
           </a:p>
@@ -4482,7 +3378,7 @@
           <p:cNvPr id="3" name="Fußzeilenplatzhalter 2">
             <a:extLst>
               <a:ext uri="{FF2B5EF4-FFF2-40B4-BE49-F238E27FC236}">
-                <a16:creationId xmlns:a16="http://schemas.microsoft.com/office/drawing/2014/main" id="{D8B2A1C5-1051-426B-B3D0-10BB51F54370}"/>
+                <a16:creationId xmlns:a16="http://schemas.microsoft.com/office/drawing/2014/main" xmlns="" id="{D8B2A1C5-1051-426B-B3D0-10BB51F54370}"/>
               </a:ext>
             </a:extLst>
           </p:cNvPr>
@@ -4507,7 +3403,7 @@
           <p:cNvPr id="4" name="Foliennummernplatzhalter 3">
             <a:extLst>
               <a:ext uri="{FF2B5EF4-FFF2-40B4-BE49-F238E27FC236}">
-                <a16:creationId xmlns:a16="http://schemas.microsoft.com/office/drawing/2014/main" id="{E9593587-0C89-4650-A0CA-5E605C8B8417}"/>
+                <a16:creationId xmlns:a16="http://schemas.microsoft.com/office/drawing/2014/main" xmlns="" id="{E9593587-0C89-4650-A0CA-5E605C8B8417}"/>
               </a:ext>
             </a:extLst>
           </p:cNvPr>
@@ -4576,7 +3472,7 @@
           <p:cNvPr id="2" name="Titel 1">
             <a:extLst>
               <a:ext uri="{FF2B5EF4-FFF2-40B4-BE49-F238E27FC236}">
-                <a16:creationId xmlns:a16="http://schemas.microsoft.com/office/drawing/2014/main" id="{7BE3D85D-357F-4A8F-8A89-DCB502001E9B}"/>
+                <a16:creationId xmlns:a16="http://schemas.microsoft.com/office/drawing/2014/main" xmlns="" id="{7BE3D85D-357F-4A8F-8A89-DCB502001E9B}"/>
               </a:ext>
             </a:extLst>
           </p:cNvPr>
@@ -4613,7 +3509,7 @@
           <p:cNvPr id="3" name="Inhaltsplatzhalter 2">
             <a:extLst>
               <a:ext uri="{FF2B5EF4-FFF2-40B4-BE49-F238E27FC236}">
-                <a16:creationId xmlns:a16="http://schemas.microsoft.com/office/drawing/2014/main" id="{6E4BB949-7F84-410B-BF1A-CC967511CE2F}"/>
+                <a16:creationId xmlns:a16="http://schemas.microsoft.com/office/drawing/2014/main" xmlns="" id="{6E4BB949-7F84-410B-BF1A-CC967511CE2F}"/>
               </a:ext>
             </a:extLst>
           </p:cNvPr>
@@ -4703,7 +3599,7 @@
           <p:cNvPr id="4" name="Textplatzhalter 3">
             <a:extLst>
               <a:ext uri="{FF2B5EF4-FFF2-40B4-BE49-F238E27FC236}">
-                <a16:creationId xmlns:a16="http://schemas.microsoft.com/office/drawing/2014/main" id="{E6179755-E5E3-4809-B916-2C34F7E7BA8A}"/>
+                <a16:creationId xmlns:a16="http://schemas.microsoft.com/office/drawing/2014/main" xmlns="" id="{E6179755-E5E3-4809-B916-2C34F7E7BA8A}"/>
               </a:ext>
             </a:extLst>
           </p:cNvPr>
@@ -4774,7 +3670,7 @@
           <p:cNvPr id="5" name="Datumsplatzhalter 4">
             <a:extLst>
               <a:ext uri="{FF2B5EF4-FFF2-40B4-BE49-F238E27FC236}">
-                <a16:creationId xmlns:a16="http://schemas.microsoft.com/office/drawing/2014/main" id="{6FE609C6-76EE-4378-A294-AE2D8F202142}"/>
+                <a16:creationId xmlns:a16="http://schemas.microsoft.com/office/drawing/2014/main" xmlns="" id="{6FE609C6-76EE-4378-A294-AE2D8F202142}"/>
               </a:ext>
             </a:extLst>
           </p:cNvPr>
@@ -4792,7 +3688,7 @@
           <a:p>
             <a:fld id="{24483E84-0737-48BA-B7F0-9EA11BFDC565}" type="datetimeFigureOut">
               <a:rPr lang="de-DE" smtClean="0"/>
-              <a:t>21.05.2019</a:t>
+              <a:t>22.05.2019</a:t>
             </a:fld>
             <a:endParaRPr lang="de-DE"/>
           </a:p>
@@ -4803,7 +3699,7 @@
           <p:cNvPr id="6" name="Fußzeilenplatzhalter 5">
             <a:extLst>
               <a:ext uri="{FF2B5EF4-FFF2-40B4-BE49-F238E27FC236}">
-                <a16:creationId xmlns:a16="http://schemas.microsoft.com/office/drawing/2014/main" id="{0F0C4AF4-19C6-4C8F-8EF0-EB5F0CCBC6E0}"/>
+                <a16:creationId xmlns:a16="http://schemas.microsoft.com/office/drawing/2014/main" xmlns="" id="{0F0C4AF4-19C6-4C8F-8EF0-EB5F0CCBC6E0}"/>
               </a:ext>
             </a:extLst>
           </p:cNvPr>
@@ -4828,7 +3724,7 @@
           <p:cNvPr id="7" name="Foliennummernplatzhalter 6">
             <a:extLst>
               <a:ext uri="{FF2B5EF4-FFF2-40B4-BE49-F238E27FC236}">
-                <a16:creationId xmlns:a16="http://schemas.microsoft.com/office/drawing/2014/main" id="{B35303EA-5D9D-470A-BC41-1397012735F9}"/>
+                <a16:creationId xmlns:a16="http://schemas.microsoft.com/office/drawing/2014/main" xmlns="" id="{B35303EA-5D9D-470A-BC41-1397012735F9}"/>
               </a:ext>
             </a:extLst>
           </p:cNvPr>
@@ -4897,7 +3793,7 @@
           <p:cNvPr id="2" name="Titel 1">
             <a:extLst>
               <a:ext uri="{FF2B5EF4-FFF2-40B4-BE49-F238E27FC236}">
-                <a16:creationId xmlns:a16="http://schemas.microsoft.com/office/drawing/2014/main" id="{D78B764D-E230-41D6-9DB1-D0891046E3E4}"/>
+                <a16:creationId xmlns:a16="http://schemas.microsoft.com/office/drawing/2014/main" xmlns="" id="{D78B764D-E230-41D6-9DB1-D0891046E3E4}"/>
               </a:ext>
             </a:extLst>
           </p:cNvPr>
@@ -4934,7 +3830,7 @@
           <p:cNvPr id="3" name="Bildplatzhalter 2">
             <a:extLst>
               <a:ext uri="{FF2B5EF4-FFF2-40B4-BE49-F238E27FC236}">
-                <a16:creationId xmlns:a16="http://schemas.microsoft.com/office/drawing/2014/main" id="{EDEC94AD-66DD-4C60-B4F9-7F9233AB7BD3}"/>
+                <a16:creationId xmlns:a16="http://schemas.microsoft.com/office/drawing/2014/main" xmlns="" id="{EDEC94AD-66DD-4C60-B4F9-7F9233AB7BD3}"/>
               </a:ext>
             </a:extLst>
           </p:cNvPr>
@@ -5001,7 +3897,7 @@
           <p:cNvPr id="4" name="Textplatzhalter 3">
             <a:extLst>
               <a:ext uri="{FF2B5EF4-FFF2-40B4-BE49-F238E27FC236}">
-                <a16:creationId xmlns:a16="http://schemas.microsoft.com/office/drawing/2014/main" id="{B39858D0-BE7E-47AC-9424-7504F7DD0459}"/>
+                <a16:creationId xmlns:a16="http://schemas.microsoft.com/office/drawing/2014/main" xmlns="" id="{B39858D0-BE7E-47AC-9424-7504F7DD0459}"/>
               </a:ext>
             </a:extLst>
           </p:cNvPr>
@@ -5072,7 +3968,7 @@
           <p:cNvPr id="5" name="Datumsplatzhalter 4">
             <a:extLst>
               <a:ext uri="{FF2B5EF4-FFF2-40B4-BE49-F238E27FC236}">
-                <a16:creationId xmlns:a16="http://schemas.microsoft.com/office/drawing/2014/main" id="{66A96562-B4E7-4198-9716-759AE10BC5E1}"/>
+                <a16:creationId xmlns:a16="http://schemas.microsoft.com/office/drawing/2014/main" xmlns="" id="{66A96562-B4E7-4198-9716-759AE10BC5E1}"/>
               </a:ext>
             </a:extLst>
           </p:cNvPr>
@@ -5090,7 +3986,7 @@
           <a:p>
             <a:fld id="{24483E84-0737-48BA-B7F0-9EA11BFDC565}" type="datetimeFigureOut">
               <a:rPr lang="de-DE" smtClean="0"/>
-              <a:t>21.05.2019</a:t>
+              <a:t>22.05.2019</a:t>
             </a:fld>
             <a:endParaRPr lang="de-DE"/>
           </a:p>
@@ -5101,7 +3997,7 @@
           <p:cNvPr id="6" name="Fußzeilenplatzhalter 5">
             <a:extLst>
               <a:ext uri="{FF2B5EF4-FFF2-40B4-BE49-F238E27FC236}">
-                <a16:creationId xmlns:a16="http://schemas.microsoft.com/office/drawing/2014/main" id="{546A1E69-018F-4FEB-BDA9-F83EDC58129B}"/>
+                <a16:creationId xmlns:a16="http://schemas.microsoft.com/office/drawing/2014/main" xmlns="" id="{546A1E69-018F-4FEB-BDA9-F83EDC58129B}"/>
               </a:ext>
             </a:extLst>
           </p:cNvPr>
@@ -5126,7 +4022,7 @@
           <p:cNvPr id="7" name="Foliennummernplatzhalter 6">
             <a:extLst>
               <a:ext uri="{FF2B5EF4-FFF2-40B4-BE49-F238E27FC236}">
-                <a16:creationId xmlns:a16="http://schemas.microsoft.com/office/drawing/2014/main" id="{4174535A-93F0-4FB0-86E0-5F1C06B3689B}"/>
+                <a16:creationId xmlns:a16="http://schemas.microsoft.com/office/drawing/2014/main" xmlns="" id="{4174535A-93F0-4FB0-86E0-5F1C06B3689B}"/>
               </a:ext>
             </a:extLst>
           </p:cNvPr>
@@ -5200,7 +4096,7 @@
           <p:cNvPr id="2" name="Titelplatzhalter 1">
             <a:extLst>
               <a:ext uri="{FF2B5EF4-FFF2-40B4-BE49-F238E27FC236}">
-                <a16:creationId xmlns:a16="http://schemas.microsoft.com/office/drawing/2014/main" id="{755848A8-3A50-4394-A3A6-674C0EBB6A48}"/>
+                <a16:creationId xmlns:a16="http://schemas.microsoft.com/office/drawing/2014/main" xmlns="" id="{755848A8-3A50-4394-A3A6-674C0EBB6A48}"/>
               </a:ext>
             </a:extLst>
           </p:cNvPr>
@@ -5238,7 +4134,7 @@
           <p:cNvPr id="3" name="Textplatzhalter 2">
             <a:extLst>
               <a:ext uri="{FF2B5EF4-FFF2-40B4-BE49-F238E27FC236}">
-                <a16:creationId xmlns:a16="http://schemas.microsoft.com/office/drawing/2014/main" id="{9E01F73F-BB8D-43DD-A88A-E726DBE77C27}"/>
+                <a16:creationId xmlns:a16="http://schemas.microsoft.com/office/drawing/2014/main" xmlns="" id="{9E01F73F-BB8D-43DD-A88A-E726DBE77C27}"/>
               </a:ext>
             </a:extLst>
           </p:cNvPr>
@@ -5305,7 +4201,7 @@
           <p:cNvPr id="4" name="Datumsplatzhalter 3">
             <a:extLst>
               <a:ext uri="{FF2B5EF4-FFF2-40B4-BE49-F238E27FC236}">
-                <a16:creationId xmlns:a16="http://schemas.microsoft.com/office/drawing/2014/main" id="{DAB69288-572C-4A0A-9F7A-FA4418D9A265}"/>
+                <a16:creationId xmlns:a16="http://schemas.microsoft.com/office/drawing/2014/main" xmlns="" id="{DAB69288-572C-4A0A-9F7A-FA4418D9A265}"/>
               </a:ext>
             </a:extLst>
           </p:cNvPr>
@@ -5341,7 +4237,7 @@
           <a:p>
             <a:fld id="{24483E84-0737-48BA-B7F0-9EA11BFDC565}" type="datetimeFigureOut">
               <a:rPr lang="de-DE" smtClean="0"/>
-              <a:t>21.05.2019</a:t>
+              <a:t>22.05.2019</a:t>
             </a:fld>
             <a:endParaRPr lang="de-DE"/>
           </a:p>
@@ -5352,7 +4248,7 @@
           <p:cNvPr id="5" name="Fußzeilenplatzhalter 4">
             <a:extLst>
               <a:ext uri="{FF2B5EF4-FFF2-40B4-BE49-F238E27FC236}">
-                <a16:creationId xmlns:a16="http://schemas.microsoft.com/office/drawing/2014/main" id="{E5717C93-130A-4E3D-A5EF-E5C1EA219F73}"/>
+                <a16:creationId xmlns:a16="http://schemas.microsoft.com/office/drawing/2014/main" xmlns="" id="{E5717C93-130A-4E3D-A5EF-E5C1EA219F73}"/>
               </a:ext>
             </a:extLst>
           </p:cNvPr>
@@ -5395,7 +4291,7 @@
           <p:cNvPr id="6" name="Foliennummernplatzhalter 5">
             <a:extLst>
               <a:ext uri="{FF2B5EF4-FFF2-40B4-BE49-F238E27FC236}">
-                <a16:creationId xmlns:a16="http://schemas.microsoft.com/office/drawing/2014/main" id="{F696EB53-93FC-431E-9961-1B6C73FC582E}"/>
+                <a16:creationId xmlns:a16="http://schemas.microsoft.com/office/drawing/2014/main" xmlns="" id="{F696EB53-93FC-431E-9961-1B6C73FC582E}"/>
               </a:ext>
             </a:extLst>
           </p:cNvPr>
@@ -5800,10 +4696,14 @@
               <a:buNone/>
             </a:pPr>
             <a:r>
-              <a:rPr lang="en"/>
-              <a:t>CP SS19</a:t>
-            </a:r>
-            <a:endParaRPr/>
+              <a:rPr lang="en" dirty="0" smtClean="0"/>
+              <a:t>Cloud Prototyping </a:t>
+            </a:r>
+            <a:r>
+              <a:rPr lang="en" dirty="0"/>
+              <a:t>SS19</a:t>
+            </a:r>
+            <a:endParaRPr dirty="0"/>
           </a:p>
         </p:txBody>
       </p:sp>
@@ -5838,10 +4738,25 @@
               <a:buNone/>
             </a:pPr>
             <a:r>
-              <a:rPr lang="en"/>
-              <a:t>Work-, Dev-Flow &amp; Architecture</a:t>
-            </a:r>
-            <a:endParaRPr/>
+              <a:rPr lang="en" dirty="0" smtClean="0"/>
+              <a:t>Decentralized Energy Trading </a:t>
+            </a:r>
+          </a:p>
+          <a:p>
+            <a:pPr marL="0" lvl="0" indent="0" algn="ctr" rtl="0">
+              <a:spcBef>
+                <a:spcPts val="0"/>
+              </a:spcBef>
+              <a:spcAft>
+                <a:spcPts val="0"/>
+              </a:spcAft>
+              <a:buNone/>
+            </a:pPr>
+            <a:r>
+              <a:rPr lang="en" dirty="0" smtClean="0"/>
+              <a:t>Midterm Presentation</a:t>
+            </a:r>
+            <a:endParaRPr dirty="0"/>
           </a:p>
         </p:txBody>
       </p:sp>
@@ -5850,15 +4765,22 @@
   <p:clrMapOvr>
     <a:masterClrMapping/>
   </p:clrMapOvr>
+  <p:timing>
+    <p:tnLst>
+      <p:par>
+        <p:cTn id="1" dur="indefinite" restart="never" nodeType="tmRoot"/>
+      </p:par>
+    </p:tnLst>
+  </p:timing>
 </p:sld>
 </file>
 
-<file path=ppt/slides/slide2.xml><?xml version="1.0" encoding="utf-8"?>
-<p:sld xmlns:a="http://schemas.openxmlformats.org/drawingml/2006/main" xmlns:r="http://schemas.openxmlformats.org/officeDocument/2006/relationships" xmlns:p="http://schemas.openxmlformats.org/presentationml/2006/main" show="0">
+<file path=ppt/slides/slide10.xml><?xml version="1.0" encoding="utf-8"?>
+<p:sld xmlns:a="http://schemas.openxmlformats.org/drawingml/2006/main" xmlns:r="http://schemas.openxmlformats.org/officeDocument/2006/relationships" xmlns:p="http://schemas.openxmlformats.org/presentationml/2006/main">
   <p:cSld>
     <p:spTree>
       <p:nvGrpSpPr>
-        <p:cNvPr id="1" name="Shape 59"/>
+        <p:cNvPr id="1" name=""/>
         <p:cNvGrpSpPr/>
         <p:nvPr/>
       </p:nvGrpSpPr>
@@ -5872,197 +4794,53 @@
       </p:grpSpPr>
       <p:sp>
         <p:nvSpPr>
-          <p:cNvPr id="60" name="Google Shape;60;p14"/>
-          <p:cNvSpPr txBox="1">
-            <a:spLocks noGrp="1"/>
-          </p:cNvSpPr>
-          <p:nvPr>
-            <p:ph type="title"/>
-          </p:nvPr>
-        </p:nvSpPr>
-        <p:spPr>
-          <a:prstGeom prst="rect">
-            <a:avLst/>
-          </a:prstGeom>
-        </p:spPr>
-        <p:txBody>
-          <a:bodyPr spcFirstLastPara="1" wrap="square" lIns="91425" tIns="91425" rIns="91425" bIns="91425" anchor="t" anchorCtr="0">
-            <a:noAutofit/>
-          </a:bodyPr>
-          <a:lstStyle/>
-          <a:p>
-            <a:pPr marL="0" lvl="0" indent="0" algn="l" rtl="0">
-              <a:spcBef>
-                <a:spcPts val="0"/>
-              </a:spcBef>
-              <a:spcAft>
-                <a:spcPts val="0"/>
-              </a:spcAft>
-              <a:buNone/>
-            </a:pPr>
-            <a:r>
-              <a:rPr lang="en"/>
-              <a:t>Workflow</a:t>
-            </a:r>
-            <a:endParaRPr/>
-          </a:p>
-        </p:txBody>
-      </p:sp>
-      <p:sp>
-        <p:nvSpPr>
-          <p:cNvPr id="61" name="Google Shape;61;p14"/>
-          <p:cNvSpPr txBox="1">
-            <a:spLocks noGrp="1"/>
-          </p:cNvSpPr>
-          <p:nvPr>
-            <p:ph type="body" idx="1"/>
-          </p:nvPr>
-        </p:nvSpPr>
-        <p:spPr>
-          <a:prstGeom prst="rect">
-            <a:avLst/>
-          </a:prstGeom>
-        </p:spPr>
-        <p:txBody>
-          <a:bodyPr spcFirstLastPara="1" wrap="square" lIns="91425" tIns="91425" rIns="91425" bIns="91425" anchor="t" anchorCtr="0">
-            <a:noAutofit/>
-          </a:bodyPr>
-          <a:lstStyle/>
-          <a:p>
-            <a:pPr marL="457200" lvl="0" indent="-342900" algn="l" rtl="0">
-              <a:spcBef>
-                <a:spcPts val="0"/>
-              </a:spcBef>
-              <a:spcAft>
-                <a:spcPts val="0"/>
-              </a:spcAft>
-              <a:buSzPts val="1800"/>
-              <a:buChar char="-"/>
-            </a:pPr>
-            <a:r>
-              <a:rPr lang="en"/>
-              <a:t>Kanban (Backlog, ToDo, In Progress, Done)</a:t>
-            </a:r>
-            <a:endParaRPr/>
-          </a:p>
-          <a:p>
-            <a:pPr marL="457200" lvl="0" indent="-342900" algn="l" rtl="0">
-              <a:spcBef>
-                <a:spcPts val="0"/>
-              </a:spcBef>
-              <a:spcAft>
-                <a:spcPts val="0"/>
-              </a:spcAft>
-              <a:buSzPts val="1800"/>
-              <a:buChar char="-"/>
-            </a:pPr>
-            <a:r>
-              <a:rPr lang="en"/>
-              <a:t>Github projects as project mgmt tool</a:t>
-            </a:r>
-            <a:endParaRPr/>
-          </a:p>
-          <a:p>
-            <a:pPr marL="457200" lvl="0" indent="-342900" algn="l" rtl="0">
-              <a:spcBef>
-                <a:spcPts val="0"/>
-              </a:spcBef>
-              <a:spcAft>
-                <a:spcPts val="0"/>
-              </a:spcAft>
-              <a:buSzPts val="1800"/>
-              <a:buChar char="-"/>
-            </a:pPr>
-            <a:r>
-              <a:rPr lang="en"/>
-              <a:t>GitHub issues for implementation tasks</a:t>
-            </a:r>
-            <a:endParaRPr/>
-          </a:p>
-          <a:p>
-            <a:pPr marL="457200" lvl="0" indent="-342900" algn="l" rtl="0">
-              <a:spcBef>
-                <a:spcPts val="0"/>
-              </a:spcBef>
-              <a:spcAft>
-                <a:spcPts val="0"/>
-              </a:spcAft>
-              <a:buSzPts val="1800"/>
-              <a:buChar char="-"/>
-            </a:pPr>
-            <a:r>
-              <a:rPr lang="en"/>
-              <a:t>Feedback loops as needed</a:t>
-            </a:r>
-            <a:endParaRPr/>
-          </a:p>
-          <a:p>
-            <a:pPr marL="457200" lvl="0" indent="-342900" algn="l" rtl="0">
-              <a:spcBef>
-                <a:spcPts val="0"/>
-              </a:spcBef>
-              <a:spcAft>
-                <a:spcPts val="0"/>
-              </a:spcAft>
-              <a:buSzPts val="1800"/>
-              <a:buChar char="-"/>
-            </a:pPr>
-            <a:r>
-              <a:rPr lang="en"/>
-              <a:t>User stories</a:t>
-            </a:r>
-            <a:endParaRPr/>
-          </a:p>
-          <a:p>
-            <a:pPr marL="457200" lvl="0" indent="-342900" algn="l" rtl="0">
-              <a:spcBef>
-                <a:spcPts val="0"/>
-              </a:spcBef>
-              <a:spcAft>
-                <a:spcPts val="0"/>
-              </a:spcAft>
-              <a:buSzPts val="1800"/>
-              <a:buChar char="-"/>
-            </a:pPr>
-            <a:r>
-              <a:rPr lang="en"/>
-              <a:t>Regular planning / refinement of stories and issues</a:t>
-            </a:r>
-            <a:endParaRPr/>
-          </a:p>
-          <a:p>
-            <a:pPr marL="457200" lvl="0" indent="-342900" algn="l" rtl="0">
-              <a:spcBef>
-                <a:spcPts val="0"/>
-              </a:spcBef>
-              <a:spcAft>
-                <a:spcPts val="0"/>
-              </a:spcAft>
-              <a:buSzPts val="1800"/>
-              <a:buChar char="-"/>
-            </a:pPr>
-            <a:r>
-              <a:rPr lang="en"/>
-              <a:t>GitHub issue templates</a:t>
-            </a:r>
-            <a:endParaRPr/>
+          <p:cNvPr id="4" name="Titel 3"/>
+          <p:cNvSpPr>
+            <a:spLocks noGrp="1"/>
+          </p:cNvSpPr>
+          <p:nvPr>
+            <p:ph type="ctrTitle"/>
+          </p:nvPr>
+        </p:nvSpPr>
+        <p:spPr/>
+        <p:txBody>
+          <a:bodyPr/>
+          <a:lstStyle/>
+          <a:p>
+            <a:r>
+              <a:rPr lang="de-DE" dirty="0" smtClean="0"/>
+              <a:t>Live Demo</a:t>
+            </a:r>
+            <a:endParaRPr lang="de-DE" dirty="0"/>
           </a:p>
         </p:txBody>
       </p:sp>
     </p:spTree>
+    <p:extLst>
+      <p:ext uri="{BB962C8B-B14F-4D97-AF65-F5344CB8AC3E}">
+        <p14:creationId xmlns:p14="http://schemas.microsoft.com/office/powerpoint/2010/main" val="821822281"/>
+      </p:ext>
+    </p:extLst>
   </p:cSld>
   <p:clrMapOvr>
     <a:masterClrMapping/>
   </p:clrMapOvr>
+  <p:timing>
+    <p:tnLst>
+      <p:par>
+        <p:cTn id="1" dur="indefinite" restart="never" nodeType="tmRoot"/>
+      </p:par>
+    </p:tnLst>
+  </p:timing>
 </p:sld>
 </file>
 
-<file path=ppt/slides/slide3.xml><?xml version="1.0" encoding="utf-8"?>
-<p:sld xmlns:a="http://schemas.openxmlformats.org/drawingml/2006/main" xmlns:r="http://schemas.openxmlformats.org/officeDocument/2006/relationships" xmlns:p="http://schemas.openxmlformats.org/presentationml/2006/main" show="0">
+<file path=ppt/slides/slide11.xml><?xml version="1.0" encoding="utf-8"?>
+<p:sld xmlns:a="http://schemas.openxmlformats.org/drawingml/2006/main" xmlns:r="http://schemas.openxmlformats.org/officeDocument/2006/relationships" xmlns:p="http://schemas.openxmlformats.org/presentationml/2006/main">
   <p:cSld>
     <p:spTree>
       <p:nvGrpSpPr>
-        <p:cNvPr id="1" name="Shape 65"/>
+        <p:cNvPr id="1" name=""/>
         <p:cNvGrpSpPr/>
         <p:nvPr/>
       </p:nvGrpSpPr>
@@ -6076,222 +4854,402 @@
       </p:grpSpPr>
       <p:sp>
         <p:nvSpPr>
-          <p:cNvPr id="66" name="Google Shape;66;p15"/>
-          <p:cNvSpPr txBox="1">
+          <p:cNvPr id="2" name="Titel 1"/>
+          <p:cNvSpPr>
             <a:spLocks noGrp="1"/>
           </p:cNvSpPr>
           <p:nvPr>
             <p:ph type="title"/>
           </p:nvPr>
         </p:nvSpPr>
-        <p:spPr>
-          <a:prstGeom prst="rect">
-            <a:avLst/>
-          </a:prstGeom>
-        </p:spPr>
-        <p:txBody>
-          <a:bodyPr spcFirstLastPara="1" wrap="square" lIns="91425" tIns="91425" rIns="91425" bIns="91425" anchor="t" anchorCtr="0">
-            <a:noAutofit/>
+        <p:spPr/>
+        <p:txBody>
+          <a:bodyPr>
+            <a:normAutofit fontScale="90000"/>
           </a:bodyPr>
           <a:lstStyle/>
           <a:p>
-            <a:pPr marL="0" lvl="0" indent="0" algn="l" rtl="0">
-              <a:spcBef>
-                <a:spcPts val="0"/>
-              </a:spcBef>
-              <a:spcAft>
-                <a:spcPts val="0"/>
-              </a:spcAft>
-              <a:buNone/>
-            </a:pPr>
-            <a:r>
-              <a:rPr lang="en"/>
-              <a:t>Devflow</a:t>
-            </a:r>
-            <a:endParaRPr/>
-          </a:p>
-        </p:txBody>
-      </p:sp>
-      <p:sp>
-        <p:nvSpPr>
-          <p:cNvPr id="67" name="Google Shape;67;p15"/>
-          <p:cNvSpPr txBox="1">
+            <a:r>
+              <a:rPr lang="de-DE" dirty="0" err="1" smtClean="0"/>
+              <a:t>Following</a:t>
+            </a:r>
+            <a:endParaRPr lang="de-DE" dirty="0"/>
+          </a:p>
+        </p:txBody>
+      </p:sp>
+      <p:sp>
+        <p:nvSpPr>
+          <p:cNvPr id="3" name="Textplatzhalter 2"/>
+          <p:cNvSpPr>
             <a:spLocks noGrp="1"/>
           </p:cNvSpPr>
           <p:nvPr>
             <p:ph type="body" idx="1"/>
           </p:nvPr>
         </p:nvSpPr>
-        <p:spPr>
-          <a:prstGeom prst="rect">
-            <a:avLst/>
-          </a:prstGeom>
-        </p:spPr>
-        <p:txBody>
-          <a:bodyPr spcFirstLastPara="1" wrap="square" lIns="91425" tIns="91425" rIns="91425" bIns="91425" anchor="t" anchorCtr="0">
-            <a:noAutofit/>
-          </a:bodyPr>
-          <a:lstStyle/>
-          <a:p>
-            <a:pPr marL="457200" lvl="0" indent="-342900" algn="l" rtl="0">
-              <a:spcBef>
-                <a:spcPts val="0"/>
-              </a:spcBef>
-              <a:spcAft>
-                <a:spcPts val="0"/>
-              </a:spcAft>
-              <a:buSzPts val="1800"/>
-              <a:buChar char="-"/>
-            </a:pPr>
-            <a:r>
-              <a:rPr lang="en"/>
-              <a:t>Simplified GitFlow</a:t>
-            </a:r>
-            <a:endParaRPr/>
-          </a:p>
-          <a:p>
-            <a:pPr marL="914400" lvl="1" indent="-317500" algn="l" rtl="0">
-              <a:spcBef>
-                <a:spcPts val="0"/>
-              </a:spcBef>
-              <a:spcAft>
-                <a:spcPts val="0"/>
-              </a:spcAft>
-              <a:buSzPts val="1400"/>
-              <a:buChar char="-"/>
-            </a:pPr>
-            <a:r>
-              <a:rPr lang="en"/>
-              <a:t>Branches: master, feature/…, fix/…, refactor/…</a:t>
-            </a:r>
-            <a:endParaRPr/>
-          </a:p>
-          <a:p>
-            <a:pPr marL="914400" lvl="1" indent="-317500" algn="l" rtl="0">
-              <a:spcBef>
-                <a:spcPts val="0"/>
-              </a:spcBef>
-              <a:spcAft>
-                <a:spcPts val="0"/>
-              </a:spcAft>
-              <a:buSzPts val="1400"/>
-              <a:buChar char="-"/>
-            </a:pPr>
-            <a:r>
-              <a:rPr lang="en"/>
-              <a:t>Opening PR into master</a:t>
-            </a:r>
-            <a:endParaRPr/>
-          </a:p>
-          <a:p>
-            <a:pPr marL="457200" lvl="0" indent="-342900" algn="l" rtl="0">
-              <a:spcBef>
-                <a:spcPts val="0"/>
-              </a:spcBef>
-              <a:spcAft>
-                <a:spcPts val="0"/>
-              </a:spcAft>
-              <a:buSzPts val="1800"/>
-              <a:buChar char="-"/>
-            </a:pPr>
-            <a:r>
-              <a:rPr lang="en"/>
-              <a:t>Clear and consistent commit messages</a:t>
-            </a:r>
-            <a:endParaRPr/>
-          </a:p>
-          <a:p>
-            <a:pPr marL="914400" lvl="1" indent="-317500" algn="l" rtl="0">
-              <a:spcBef>
-                <a:spcPts val="0"/>
-              </a:spcBef>
-              <a:spcAft>
-                <a:spcPts val="0"/>
-              </a:spcAft>
-              <a:buSzPts val="1400"/>
-              <a:buChar char="-"/>
-            </a:pPr>
-            <a:r>
-              <a:rPr lang="en"/>
-              <a:t>Short title: Add, Update, Change, Remove, …</a:t>
-            </a:r>
-            <a:endParaRPr/>
-          </a:p>
-          <a:p>
-            <a:pPr marL="914400" lvl="1" indent="-317500" algn="l" rtl="0">
-              <a:spcBef>
-                <a:spcPts val="0"/>
-              </a:spcBef>
-              <a:spcAft>
-                <a:spcPts val="0"/>
-              </a:spcAft>
-              <a:buSzPts val="1400"/>
-              <a:buChar char="-"/>
-            </a:pPr>
-            <a:r>
-              <a:rPr lang="en"/>
-              <a:t>Detailed body if needed</a:t>
-            </a:r>
-            <a:endParaRPr/>
-          </a:p>
-          <a:p>
-            <a:pPr marL="914400" lvl="1" indent="-317500" algn="l" rtl="0">
-              <a:spcBef>
-                <a:spcPts val="0"/>
-              </a:spcBef>
-              <a:spcAft>
-                <a:spcPts val="0"/>
-              </a:spcAft>
-              <a:buSzPts val="1400"/>
-              <a:buChar char="-"/>
-            </a:pPr>
-            <a:r>
-              <a:rPr lang="en"/>
-              <a:t>Related issues </a:t>
-            </a:r>
-            <a:endParaRPr/>
-          </a:p>
-          <a:p>
-            <a:pPr marL="457200" lvl="0" indent="-342900" algn="l" rtl="0">
-              <a:spcBef>
-                <a:spcPts val="0"/>
-              </a:spcBef>
-              <a:spcAft>
-                <a:spcPts val="0"/>
-              </a:spcAft>
-              <a:buSzPts val="1800"/>
-              <a:buChar char="-"/>
-            </a:pPr>
-            <a:r>
-              <a:rPr lang="en"/>
-              <a:t>At least 1 or 2 reviews before merging</a:t>
-            </a:r>
-            <a:endParaRPr/>
-          </a:p>
-          <a:p>
-            <a:pPr marL="457200" lvl="0" indent="-342900" algn="l" rtl="0">
-              <a:spcBef>
-                <a:spcPts val="0"/>
-              </a:spcBef>
-              <a:spcAft>
-                <a:spcPts val="0"/>
-              </a:spcAft>
-              <a:buSzPts val="1800"/>
-              <a:buChar char="-"/>
-            </a:pPr>
-            <a:r>
-              <a:rPr lang="en"/>
-              <a:t>CI checks: linter, tests, ...</a:t>
-            </a:r>
-            <a:endParaRPr/>
+        <p:spPr/>
+        <p:txBody>
+          <a:bodyPr/>
+          <a:lstStyle/>
+          <a:p>
+            <a:endParaRPr lang="de-DE" dirty="0"/>
           </a:p>
         </p:txBody>
       </p:sp>
     </p:spTree>
+    <p:extLst>
+      <p:ext uri="{BB962C8B-B14F-4D97-AF65-F5344CB8AC3E}">
+        <p14:creationId xmlns:p14="http://schemas.microsoft.com/office/powerpoint/2010/main" val="2184405834"/>
+      </p:ext>
+    </p:extLst>
   </p:cSld>
   <p:clrMapOvr>
     <a:masterClrMapping/>
   </p:clrMapOvr>
+  <p:timing>
+    <p:tnLst>
+      <p:par>
+        <p:cTn id="1" dur="indefinite" restart="never" nodeType="tmRoot"/>
+      </p:par>
+    </p:tnLst>
+  </p:timing>
+</p:sld>
+</file>
+
+<file path=ppt/slides/slide2.xml><?xml version="1.0" encoding="utf-8"?>
+<p:sld xmlns:a="http://schemas.openxmlformats.org/drawingml/2006/main" xmlns:r="http://schemas.openxmlformats.org/officeDocument/2006/relationships" xmlns:p="http://schemas.openxmlformats.org/presentationml/2006/main">
+  <p:cSld>
+    <p:spTree>
+      <p:nvGrpSpPr>
+        <p:cNvPr id="1" name=""/>
+        <p:cNvGrpSpPr/>
+        <p:nvPr/>
+      </p:nvGrpSpPr>
+      <p:grpSpPr>
+        <a:xfrm>
+          <a:off x="0" y="0"/>
+          <a:ext cx="0" cy="0"/>
+          <a:chOff x="0" y="0"/>
+          <a:chExt cx="0" cy="0"/>
+        </a:xfrm>
+      </p:grpSpPr>
+      <p:sp>
+        <p:nvSpPr>
+          <p:cNvPr id="2" name="Titel 1"/>
+          <p:cNvSpPr>
+            <a:spLocks noGrp="1"/>
+          </p:cNvSpPr>
+          <p:nvPr>
+            <p:ph type="title"/>
+          </p:nvPr>
+        </p:nvSpPr>
+        <p:spPr/>
+        <p:txBody>
+          <a:bodyPr/>
+          <a:lstStyle/>
+          <a:p>
+            <a:r>
+              <a:rPr lang="de-DE" dirty="0" smtClean="0"/>
+              <a:t>Table </a:t>
+            </a:r>
+            <a:r>
+              <a:rPr lang="de-DE" dirty="0" err="1" smtClean="0"/>
+              <a:t>of</a:t>
+            </a:r>
+            <a:r>
+              <a:rPr lang="de-DE" dirty="0" smtClean="0"/>
+              <a:t> Content</a:t>
+            </a:r>
+            <a:endParaRPr lang="de-DE" dirty="0"/>
+          </a:p>
+        </p:txBody>
+      </p:sp>
+      <p:sp>
+        <p:nvSpPr>
+          <p:cNvPr id="3" name="Inhaltsplatzhalter 2"/>
+          <p:cNvSpPr>
+            <a:spLocks noGrp="1"/>
+          </p:cNvSpPr>
+          <p:nvPr>
+            <p:ph idx="1"/>
+          </p:nvPr>
+        </p:nvSpPr>
+        <p:spPr/>
+        <p:txBody>
+          <a:bodyPr/>
+          <a:lstStyle/>
+          <a:p>
+            <a:pPr marL="457200" indent="-457200">
+              <a:buFont typeface="+mj-lt"/>
+              <a:buAutoNum type="arabicPeriod"/>
+            </a:pPr>
+            <a:r>
+              <a:rPr lang="de-DE" dirty="0" smtClean="0"/>
+              <a:t>Task </a:t>
+            </a:r>
+            <a:r>
+              <a:rPr lang="de-DE" dirty="0" err="1" smtClean="0"/>
+              <a:t>description</a:t>
+            </a:r>
+            <a:r>
+              <a:rPr lang="de-DE" dirty="0" smtClean="0"/>
+              <a:t> </a:t>
+            </a:r>
+            <a:r>
+              <a:rPr lang="de-DE" dirty="0" err="1" smtClean="0"/>
+              <a:t>and</a:t>
+            </a:r>
+            <a:r>
+              <a:rPr lang="de-DE" dirty="0" smtClean="0"/>
+              <a:t> Motivation</a:t>
+            </a:r>
+          </a:p>
+          <a:p>
+            <a:pPr marL="457200" indent="-457200">
+              <a:buFont typeface="+mj-lt"/>
+              <a:buAutoNum type="arabicPeriod"/>
+            </a:pPr>
+            <a:r>
+              <a:rPr lang="de-DE" dirty="0" err="1" smtClean="0"/>
+              <a:t>Architecture</a:t>
+            </a:r>
+            <a:endParaRPr lang="de-DE" dirty="0" smtClean="0"/>
+          </a:p>
+          <a:p>
+            <a:pPr marL="457200" indent="-457200">
+              <a:buFont typeface="+mj-lt"/>
+              <a:buAutoNum type="arabicPeriod"/>
+            </a:pPr>
+            <a:r>
+              <a:rPr lang="de-DE" dirty="0" err="1" smtClean="0"/>
+              <a:t>Current</a:t>
+            </a:r>
+            <a:r>
+              <a:rPr lang="de-DE" dirty="0" smtClean="0"/>
+              <a:t> </a:t>
+            </a:r>
+            <a:r>
+              <a:rPr lang="de-DE" dirty="0" err="1" smtClean="0"/>
+              <a:t>implementation</a:t>
+            </a:r>
+            <a:endParaRPr lang="de-DE" dirty="0" smtClean="0"/>
+          </a:p>
+          <a:p>
+            <a:pPr marL="800100" lvl="1" indent="-457200">
+              <a:buFont typeface="+mj-lt"/>
+              <a:buAutoNum type="romanLcPeriod"/>
+            </a:pPr>
+            <a:r>
+              <a:rPr lang="de-DE" dirty="0" err="1" smtClean="0"/>
+              <a:t>Blockchain</a:t>
+            </a:r>
+            <a:r>
+              <a:rPr lang="de-DE" dirty="0" smtClean="0"/>
+              <a:t> </a:t>
+            </a:r>
+            <a:endParaRPr lang="de-DE" dirty="0"/>
+          </a:p>
+          <a:p>
+            <a:pPr marL="800100" lvl="1" indent="-457200">
+              <a:buFont typeface="+mj-lt"/>
+              <a:buAutoNum type="romanLcPeriod"/>
+            </a:pPr>
+            <a:r>
+              <a:rPr lang="de-DE" dirty="0" err="1" smtClean="0"/>
+              <a:t>Household</a:t>
+            </a:r>
+            <a:r>
+              <a:rPr lang="de-DE" dirty="0" smtClean="0"/>
+              <a:t> </a:t>
+            </a:r>
+            <a:r>
+              <a:rPr lang="de-DE" dirty="0" err="1"/>
+              <a:t>processing</a:t>
+            </a:r>
+            <a:r>
+              <a:rPr lang="de-DE" dirty="0"/>
+              <a:t> </a:t>
+            </a:r>
+            <a:r>
+              <a:rPr lang="de-DE" dirty="0" err="1" smtClean="0"/>
+              <a:t>unit</a:t>
+            </a:r>
+            <a:endParaRPr lang="de-DE" dirty="0" smtClean="0"/>
+          </a:p>
+          <a:p>
+            <a:pPr marL="800100" lvl="1" indent="-457200">
+              <a:buFont typeface="+mj-lt"/>
+              <a:buAutoNum type="romanLcPeriod"/>
+            </a:pPr>
+            <a:r>
+              <a:rPr lang="de-DE" dirty="0" smtClean="0"/>
+              <a:t>Utility </a:t>
+            </a:r>
+            <a:r>
+              <a:rPr lang="de-DE" dirty="0" err="1"/>
+              <a:t>Contract</a:t>
+            </a:r>
+            <a:r>
+              <a:rPr lang="de-DE" dirty="0"/>
+              <a:t> (</a:t>
+            </a:r>
+            <a:r>
+              <a:rPr lang="de-DE" dirty="0" err="1"/>
+              <a:t>settlement</a:t>
+            </a:r>
+            <a:r>
+              <a:rPr lang="de-DE" dirty="0"/>
+              <a:t> </a:t>
+            </a:r>
+            <a:r>
+              <a:rPr lang="de-DE" dirty="0" err="1"/>
+              <a:t>algorithm</a:t>
+            </a:r>
+            <a:r>
+              <a:rPr lang="de-DE" dirty="0"/>
+              <a:t>)</a:t>
+            </a:r>
+          </a:p>
+          <a:p>
+            <a:pPr marL="800100" lvl="1" indent="-457200">
+              <a:buFont typeface="+mj-lt"/>
+              <a:buAutoNum type="romanLcPeriod"/>
+            </a:pPr>
+            <a:r>
+              <a:rPr lang="de-DE" dirty="0"/>
+              <a:t>Live </a:t>
+            </a:r>
+            <a:r>
+              <a:rPr lang="de-DE" dirty="0" err="1" smtClean="0"/>
+              <a:t>demo</a:t>
+            </a:r>
+            <a:endParaRPr lang="de-DE" dirty="0" smtClean="0"/>
+          </a:p>
+          <a:p>
+            <a:pPr marL="457200" indent="-457200">
+              <a:buFont typeface="+mj-lt"/>
+              <a:buAutoNum type="arabicPeriod"/>
+            </a:pPr>
+            <a:r>
+              <a:rPr lang="de-DE" dirty="0" err="1" smtClean="0"/>
+              <a:t>Following</a:t>
+            </a:r>
+            <a:endParaRPr lang="de-DE" dirty="0" smtClean="0"/>
+          </a:p>
+        </p:txBody>
+      </p:sp>
+    </p:spTree>
+    <p:extLst>
+      <p:ext uri="{BB962C8B-B14F-4D97-AF65-F5344CB8AC3E}">
+        <p14:creationId xmlns:p14="http://schemas.microsoft.com/office/powerpoint/2010/main" val="1533802349"/>
+      </p:ext>
+    </p:extLst>
+  </p:cSld>
+  <p:clrMapOvr>
+    <a:masterClrMapping/>
+  </p:clrMapOvr>
+  <p:timing>
+    <p:tnLst>
+      <p:par>
+        <p:cTn id="1" dur="indefinite" restart="never" nodeType="tmRoot"/>
+      </p:par>
+    </p:tnLst>
+  </p:timing>
+</p:sld>
+</file>
+
+<file path=ppt/slides/slide3.xml><?xml version="1.0" encoding="utf-8"?>
+<p:sld xmlns:a="http://schemas.openxmlformats.org/drawingml/2006/main" xmlns:r="http://schemas.openxmlformats.org/officeDocument/2006/relationships" xmlns:p="http://schemas.openxmlformats.org/presentationml/2006/main">
+  <p:cSld>
+    <p:spTree>
+      <p:nvGrpSpPr>
+        <p:cNvPr id="1" name=""/>
+        <p:cNvGrpSpPr/>
+        <p:nvPr/>
+      </p:nvGrpSpPr>
+      <p:grpSpPr>
+        <a:xfrm>
+          <a:off x="0" y="0"/>
+          <a:ext cx="0" cy="0"/>
+          <a:chOff x="0" y="0"/>
+          <a:chExt cx="0" cy="0"/>
+        </a:xfrm>
+      </p:grpSpPr>
+      <p:sp>
+        <p:nvSpPr>
+          <p:cNvPr id="2" name="Titel 1"/>
+          <p:cNvSpPr>
+            <a:spLocks noGrp="1"/>
+          </p:cNvSpPr>
+          <p:nvPr>
+            <p:ph type="title"/>
+          </p:nvPr>
+        </p:nvSpPr>
+        <p:spPr/>
+        <p:txBody>
+          <a:bodyPr/>
+          <a:lstStyle/>
+          <a:p>
+            <a:r>
+              <a:rPr lang="de-DE" dirty="0" smtClean="0"/>
+              <a:t>Task </a:t>
+            </a:r>
+            <a:r>
+              <a:rPr lang="de-DE" dirty="0" err="1" smtClean="0"/>
+              <a:t>description</a:t>
+            </a:r>
+            <a:r>
+              <a:rPr lang="de-DE" dirty="0" smtClean="0"/>
+              <a:t> </a:t>
+            </a:r>
+            <a:r>
+              <a:rPr lang="de-DE" dirty="0" err="1" smtClean="0"/>
+              <a:t>and</a:t>
+            </a:r>
+            <a:r>
+              <a:rPr lang="de-DE" dirty="0" smtClean="0"/>
+              <a:t> Motivation</a:t>
+            </a:r>
+            <a:endParaRPr lang="de-DE" dirty="0"/>
+          </a:p>
+        </p:txBody>
+      </p:sp>
+      <p:sp>
+        <p:nvSpPr>
+          <p:cNvPr id="3" name="Inhaltsplatzhalter 2"/>
+          <p:cNvSpPr>
+            <a:spLocks noGrp="1"/>
+          </p:cNvSpPr>
+          <p:nvPr>
+            <p:ph idx="1"/>
+          </p:nvPr>
+        </p:nvSpPr>
+        <p:spPr/>
+        <p:txBody>
+          <a:bodyPr/>
+          <a:lstStyle/>
+          <a:p>
+            <a:endParaRPr lang="de-DE"/>
+          </a:p>
+        </p:txBody>
+      </p:sp>
+    </p:spTree>
+    <p:extLst>
+      <p:ext uri="{BB962C8B-B14F-4D97-AF65-F5344CB8AC3E}">
+        <p14:creationId xmlns:p14="http://schemas.microsoft.com/office/powerpoint/2010/main" val="524911424"/>
+      </p:ext>
+    </p:extLst>
+  </p:cSld>
+  <p:clrMapOvr>
+    <a:masterClrMapping/>
+  </p:clrMapOvr>
+  <p:timing>
+    <p:tnLst>
+      <p:par>
+        <p:cTn id="1" dur="indefinite" restart="never" nodeType="tmRoot"/>
+      </p:par>
+    </p:tnLst>
+  </p:timing>
 </p:sld>
 </file>
 
@@ -6338,28 +5296,28 @@
       </p:sp>
       <p:pic>
         <p:nvPicPr>
-          <p:cNvPr id="5" name="Grafik 4">
-            <a:extLst>
-              <a:ext uri="{FF2B5EF4-FFF2-40B4-BE49-F238E27FC236}">
-                <a16:creationId xmlns:a16="http://schemas.microsoft.com/office/drawing/2014/main" id="{A738FD48-57B5-4A29-997A-BDD7B30A62C0}"/>
-              </a:ext>
-            </a:extLst>
-          </p:cNvPr>
+          <p:cNvPr id="3" name="Grafik 2"/>
           <p:cNvPicPr>
             <a:picLocks noChangeAspect="1"/>
           </p:cNvPicPr>
           <p:nvPr/>
         </p:nvPicPr>
         <p:blipFill>
-          <a:blip r:embed="rId3"/>
+          <a:blip r:embed="rId3">
+            <a:extLst>
+              <a:ext uri="{28A0092B-C50C-407E-A947-70E740481C1C}">
+                <a14:useLocalDpi xmlns:a14="http://schemas.microsoft.com/office/drawing/2010/main" val="0"/>
+              </a:ext>
+            </a:extLst>
+          </a:blip>
           <a:stretch>
             <a:fillRect/>
           </a:stretch>
         </p:blipFill>
         <p:spPr>
           <a:xfrm>
-            <a:off x="704850" y="1242027"/>
-            <a:ext cx="7734300" cy="3248025"/>
+            <a:off x="311700" y="1144991"/>
+            <a:ext cx="8559630" cy="3493511"/>
           </a:xfrm>
           <a:prstGeom prst="rect">
             <a:avLst/>
@@ -6376,15 +5334,22 @@
   <p:clrMapOvr>
     <a:masterClrMapping/>
   </p:clrMapOvr>
+  <p:timing>
+    <p:tnLst>
+      <p:par>
+        <p:cTn id="1" dur="indefinite" restart="never" nodeType="tmRoot"/>
+      </p:par>
+    </p:tnLst>
+  </p:timing>
 </p:sld>
 </file>
 
 <file path=ppt/slides/slide5.xml><?xml version="1.0" encoding="utf-8"?>
-<p:sld xmlns:a="http://schemas.openxmlformats.org/drawingml/2006/main" xmlns:r="http://schemas.openxmlformats.org/officeDocument/2006/relationships" xmlns:p="http://schemas.openxmlformats.org/presentationml/2006/main" show="0">
+<p:sld xmlns:a="http://schemas.openxmlformats.org/drawingml/2006/main" xmlns:r="http://schemas.openxmlformats.org/officeDocument/2006/relationships" xmlns:p="http://schemas.openxmlformats.org/presentationml/2006/main">
   <p:cSld>
     <p:spTree>
       <p:nvGrpSpPr>
-        <p:cNvPr id="1" name="Shape 105"/>
+        <p:cNvPr id="1" name=""/>
         <p:cNvGrpSpPr/>
         <p:nvPr/>
       </p:nvGrpSpPr>
@@ -6398,183 +5363,52 @@
       </p:grpSpPr>
       <p:sp>
         <p:nvSpPr>
-          <p:cNvPr id="106" name="Google Shape;106;p17"/>
-          <p:cNvSpPr txBox="1">
-            <a:spLocks noGrp="1"/>
-          </p:cNvSpPr>
-          <p:nvPr>
-            <p:ph type="title"/>
-          </p:nvPr>
-        </p:nvSpPr>
-        <p:spPr>
-          <a:prstGeom prst="rect">
-            <a:avLst/>
-          </a:prstGeom>
-        </p:spPr>
-        <p:txBody>
-          <a:bodyPr spcFirstLastPara="1" wrap="square" lIns="91425" tIns="91425" rIns="91425" bIns="91425" anchor="t" anchorCtr="0">
-            <a:noAutofit/>
-          </a:bodyPr>
-          <a:lstStyle/>
-          <a:p>
-            <a:pPr marL="0" lvl="0" indent="0" algn="l" rtl="0">
-              <a:spcBef>
-                <a:spcPts val="0"/>
-              </a:spcBef>
-              <a:spcAft>
-                <a:spcPts val="0"/>
-              </a:spcAft>
-              <a:buNone/>
-            </a:pPr>
-            <a:r>
-              <a:rPr lang="en"/>
-              <a:t>Tech Stack</a:t>
-            </a:r>
-            <a:endParaRPr/>
-          </a:p>
-        </p:txBody>
-      </p:sp>
-      <p:sp>
-        <p:nvSpPr>
-          <p:cNvPr id="107" name="Google Shape;107;p17"/>
-          <p:cNvSpPr txBox="1">
-            <a:spLocks noGrp="1"/>
-          </p:cNvSpPr>
-          <p:nvPr>
-            <p:ph type="body" idx="1"/>
-          </p:nvPr>
-        </p:nvSpPr>
-        <p:spPr>
-          <a:prstGeom prst="rect">
-            <a:avLst/>
-          </a:prstGeom>
-        </p:spPr>
-        <p:txBody>
-          <a:bodyPr spcFirstLastPara="1" wrap="square" lIns="91425" tIns="91425" rIns="91425" bIns="91425" anchor="t" anchorCtr="0">
-            <a:noAutofit/>
-          </a:bodyPr>
-          <a:lstStyle/>
-          <a:p>
-            <a:pPr marL="457200" lvl="0" indent="-342900" algn="l" rtl="0">
-              <a:spcBef>
-                <a:spcPts val="0"/>
-              </a:spcBef>
-              <a:spcAft>
-                <a:spcPts val="0"/>
-              </a:spcAft>
-              <a:buSzPts val="1800"/>
-              <a:buAutoNum type="arabicPeriod"/>
-            </a:pPr>
-            <a:r>
-              <a:rPr lang="en"/>
-              <a:t>Mock Sensor - Node.js, REST API (Koa / Express)</a:t>
-            </a:r>
-            <a:endParaRPr/>
-          </a:p>
-          <a:p>
-            <a:pPr marL="457200" lvl="0" indent="-342900" algn="l" rtl="0">
-              <a:spcBef>
-                <a:spcPts val="0"/>
-              </a:spcBef>
-              <a:spcAft>
-                <a:spcPts val="0"/>
-              </a:spcAft>
-              <a:buSzPts val="1800"/>
-              <a:buAutoNum type="arabicPeriod"/>
-            </a:pPr>
-            <a:r>
-              <a:rPr lang="en"/>
-              <a:t>Prosumer - Node.js, web3.js / ethers.js, REST API (Koa / Express)</a:t>
-            </a:r>
-            <a:endParaRPr/>
-          </a:p>
-          <a:p>
-            <a:pPr marL="457200" lvl="0" indent="-342900" algn="l" rtl="0">
-              <a:spcBef>
-                <a:spcPts val="0"/>
-              </a:spcBef>
-              <a:spcAft>
-                <a:spcPts val="0"/>
-              </a:spcAft>
-              <a:buSzPts val="1800"/>
-              <a:buAutoNum type="arabicPeriod"/>
-            </a:pPr>
-            <a:r>
-              <a:rPr lang="en"/>
-              <a:t>Authority Node - Parity</a:t>
-            </a:r>
-            <a:endParaRPr/>
-          </a:p>
-          <a:p>
-            <a:pPr marL="457200" lvl="0" indent="-342900" algn="l" rtl="0">
-              <a:spcBef>
-                <a:spcPts val="0"/>
-              </a:spcBef>
-              <a:spcAft>
-                <a:spcPts val="0"/>
-              </a:spcAft>
-              <a:buSzPts val="1800"/>
-              <a:buAutoNum type="arabicPeriod"/>
-            </a:pPr>
-            <a:r>
-              <a:rPr lang="en"/>
-              <a:t>UI - React</a:t>
-            </a:r>
-            <a:endParaRPr/>
-          </a:p>
-          <a:p>
-            <a:pPr marL="457200" lvl="0" indent="-342900" algn="l" rtl="0">
-              <a:spcBef>
-                <a:spcPts val="0"/>
-              </a:spcBef>
-              <a:spcAft>
-                <a:spcPts val="0"/>
-              </a:spcAft>
-              <a:buSzPts val="1800"/>
-              <a:buAutoNum type="arabicPeriod"/>
-            </a:pPr>
-            <a:r>
-              <a:rPr lang="en"/>
-              <a:t>Contracts - Solidity, truffle</a:t>
-            </a:r>
-            <a:endParaRPr/>
-          </a:p>
-          <a:p>
-            <a:pPr marL="0" lvl="0" indent="0" algn="l" rtl="0">
-              <a:spcBef>
-                <a:spcPts val="1600"/>
-              </a:spcBef>
-              <a:spcAft>
-                <a:spcPts val="0"/>
-              </a:spcAft>
-              <a:buNone/>
-            </a:pPr>
-            <a:endParaRPr/>
-          </a:p>
-          <a:p>
-            <a:pPr marL="457200" lvl="0" indent="-342900" algn="l" rtl="0">
-              <a:spcBef>
-                <a:spcPts val="1600"/>
-              </a:spcBef>
-              <a:spcAft>
-                <a:spcPts val="0"/>
-              </a:spcAft>
-              <a:buSzPts val="1800"/>
-              <a:buChar char="+"/>
-            </a:pPr>
-            <a:r>
-              <a:rPr lang="en"/>
-              <a:t>DOCKERFILE for each component and docker-compose</a:t>
-            </a:r>
-            <a:endParaRPr/>
+          <p:cNvPr id="4" name="Titel 3"/>
+          <p:cNvSpPr>
+            <a:spLocks noGrp="1"/>
+          </p:cNvSpPr>
+          <p:nvPr>
+            <p:ph type="ctrTitle"/>
+          </p:nvPr>
+        </p:nvSpPr>
+        <p:spPr/>
+        <p:txBody>
+          <a:bodyPr/>
+          <a:lstStyle/>
+          <a:p>
+            <a:r>
+              <a:rPr lang="de-DE" dirty="0" err="1" smtClean="0"/>
+              <a:t>Current</a:t>
+            </a:r>
+            <a:r>
+              <a:rPr lang="de-DE" dirty="0" smtClean="0"/>
+              <a:t> </a:t>
+            </a:r>
+            <a:r>
+              <a:rPr lang="de-DE" dirty="0" err="1" smtClean="0"/>
+              <a:t>implementation</a:t>
+            </a:r>
+            <a:endParaRPr lang="de-DE" dirty="0"/>
           </a:p>
         </p:txBody>
       </p:sp>
     </p:spTree>
+    <p:extLst>
+      <p:ext uri="{BB962C8B-B14F-4D97-AF65-F5344CB8AC3E}">
+        <p14:creationId xmlns:p14="http://schemas.microsoft.com/office/powerpoint/2010/main" val="2478735765"/>
+      </p:ext>
+    </p:extLst>
   </p:cSld>
   <p:clrMapOvr>
     <a:masterClrMapping/>
   </p:clrMapOvr>
+  <p:timing>
+    <p:tnLst>
+      <p:par>
+        <p:cTn id="1" dur="indefinite" restart="never" nodeType="tmRoot"/>
+      </p:par>
+    </p:tnLst>
+  </p:timing>
 </p:sld>
 </file>
 
@@ -6597,13 +5431,7 @@
       </p:grpSpPr>
       <p:sp>
         <p:nvSpPr>
-          <p:cNvPr id="2" name="Titel 1">
-            <a:extLst>
-              <a:ext uri="{FF2B5EF4-FFF2-40B4-BE49-F238E27FC236}">
-                <a16:creationId xmlns:a16="http://schemas.microsoft.com/office/drawing/2014/main" id="{4F201D36-9280-479F-A6D3-D519DC893AF8}"/>
-              </a:ext>
-            </a:extLst>
-          </p:cNvPr>
+          <p:cNvPr id="2" name="Titel 1"/>
           <p:cNvSpPr>
             <a:spLocks noGrp="1"/>
           </p:cNvSpPr>
@@ -6619,6 +5447,136 @@
           <a:lstStyle/>
           <a:p>
             <a:r>
+              <a:rPr lang="de-DE" dirty="0" err="1" smtClean="0"/>
+              <a:t>Blockchain</a:t>
+            </a:r>
+            <a:endParaRPr lang="de-DE" dirty="0"/>
+          </a:p>
+        </p:txBody>
+      </p:sp>
+      <p:sp>
+        <p:nvSpPr>
+          <p:cNvPr id="3" name="Textplatzhalter 2"/>
+          <p:cNvSpPr>
+            <a:spLocks noGrp="1"/>
+          </p:cNvSpPr>
+          <p:nvPr>
+            <p:ph type="body" idx="1"/>
+          </p:nvPr>
+        </p:nvSpPr>
+        <p:spPr/>
+        <p:txBody>
+          <a:bodyPr/>
+          <a:lstStyle/>
+          <a:p>
+            <a:r>
+              <a:rPr lang="de-DE" dirty="0" err="1" smtClean="0"/>
+              <a:t>PoA</a:t>
+            </a:r>
+            <a:endParaRPr lang="de-DE" dirty="0" smtClean="0"/>
+          </a:p>
+          <a:p>
+            <a:r>
+              <a:rPr lang="de-DE" dirty="0" err="1" smtClean="0"/>
+              <a:t>Built</a:t>
+            </a:r>
+            <a:r>
+              <a:rPr lang="de-DE" dirty="0" smtClean="0"/>
+              <a:t> on </a:t>
+            </a:r>
+            <a:r>
+              <a:rPr lang="de-DE" dirty="0" err="1" smtClean="0"/>
+              <a:t>Parity</a:t>
+            </a:r>
+            <a:r>
+              <a:rPr lang="de-DE" dirty="0" smtClean="0"/>
+              <a:t> (</a:t>
+            </a:r>
+            <a:r>
+              <a:rPr lang="de-DE" dirty="0" err="1" smtClean="0"/>
+              <a:t>currently</a:t>
+            </a:r>
+            <a:r>
+              <a:rPr lang="de-DE" dirty="0" smtClean="0"/>
+              <a:t>?)</a:t>
+            </a:r>
+          </a:p>
+          <a:p>
+            <a:r>
+              <a:rPr lang="de-DE" dirty="0" err="1" smtClean="0"/>
+              <a:t>Validator</a:t>
+            </a:r>
+            <a:r>
+              <a:rPr lang="de-DE" dirty="0" smtClean="0"/>
+              <a:t> Set </a:t>
+            </a:r>
+          </a:p>
+          <a:p>
+            <a:endParaRPr lang="de-DE" dirty="0"/>
+          </a:p>
+        </p:txBody>
+      </p:sp>
+    </p:spTree>
+    <p:extLst>
+      <p:ext uri="{BB962C8B-B14F-4D97-AF65-F5344CB8AC3E}">
+        <p14:creationId xmlns:p14="http://schemas.microsoft.com/office/powerpoint/2010/main" val="3497537485"/>
+      </p:ext>
+    </p:extLst>
+  </p:cSld>
+  <p:clrMapOvr>
+    <a:masterClrMapping/>
+  </p:clrMapOvr>
+  <p:timing>
+    <p:tnLst>
+      <p:par>
+        <p:cTn id="1" dur="indefinite" restart="never" nodeType="tmRoot"/>
+      </p:par>
+    </p:tnLst>
+  </p:timing>
+</p:sld>
+</file>
+
+<file path=ppt/slides/slide7.xml><?xml version="1.0" encoding="utf-8"?>
+<p:sld xmlns:a="http://schemas.openxmlformats.org/drawingml/2006/main" xmlns:r="http://schemas.openxmlformats.org/officeDocument/2006/relationships" xmlns:p="http://schemas.openxmlformats.org/presentationml/2006/main">
+  <p:cSld>
+    <p:spTree>
+      <p:nvGrpSpPr>
+        <p:cNvPr id="1" name=""/>
+        <p:cNvGrpSpPr/>
+        <p:nvPr/>
+      </p:nvGrpSpPr>
+      <p:grpSpPr>
+        <a:xfrm>
+          <a:off x="0" y="0"/>
+          <a:ext cx="0" cy="0"/>
+          <a:chOff x="0" y="0"/>
+          <a:chExt cx="0" cy="0"/>
+        </a:xfrm>
+      </p:grpSpPr>
+      <p:sp>
+        <p:nvSpPr>
+          <p:cNvPr id="2" name="Titel 1">
+            <a:extLst>
+              <a:ext uri="{FF2B5EF4-FFF2-40B4-BE49-F238E27FC236}">
+                <a16:creationId xmlns:a16="http://schemas.microsoft.com/office/drawing/2014/main" xmlns="" id="{4F201D36-9280-479F-A6D3-D519DC893AF8}"/>
+              </a:ext>
+            </a:extLst>
+          </p:cNvPr>
+          <p:cNvSpPr>
+            <a:spLocks noGrp="1"/>
+          </p:cNvSpPr>
+          <p:nvPr>
+            <p:ph type="title"/>
+          </p:nvPr>
+        </p:nvSpPr>
+        <p:spPr/>
+        <p:txBody>
+          <a:bodyPr>
+            <a:normAutofit fontScale="90000"/>
+          </a:bodyPr>
+          <a:lstStyle/>
+          <a:p>
+            <a:r>
               <a:rPr lang="de-DE" dirty="0"/>
               <a:t>Household Server GET Request </a:t>
             </a:r>
@@ -6638,7 +5596,7 @@
           <p:cNvPr id="7" name="Grafik 6">
             <a:extLst>
               <a:ext uri="{FF2B5EF4-FFF2-40B4-BE49-F238E27FC236}">
-                <a16:creationId xmlns:a16="http://schemas.microsoft.com/office/drawing/2014/main" id="{0261B3A8-C205-4F4A-BA78-1CB834D4FBEC}"/>
+                <a16:creationId xmlns:a16="http://schemas.microsoft.com/office/drawing/2014/main" xmlns="" id="{0261B3A8-C205-4F4A-BA78-1CB834D4FBEC}"/>
               </a:ext>
             </a:extLst>
           </p:cNvPr>
@@ -6673,10 +5631,17 @@
   <p:clrMapOvr>
     <a:masterClrMapping/>
   </p:clrMapOvr>
+  <p:timing>
+    <p:tnLst>
+      <p:par>
+        <p:cTn id="1" dur="indefinite" restart="never" nodeType="tmRoot"/>
+      </p:par>
+    </p:tnLst>
+  </p:timing>
 </p:sld>
 </file>
 
-<file path=ppt/slides/slide7.xml><?xml version="1.0" encoding="utf-8"?>
+<file path=ppt/slides/slide8.xml><?xml version="1.0" encoding="utf-8"?>
 <p:sld xmlns:a="http://schemas.openxmlformats.org/drawingml/2006/main" xmlns:r="http://schemas.openxmlformats.org/officeDocument/2006/relationships" xmlns:p="http://schemas.openxmlformats.org/presentationml/2006/main">
   <p:cSld>
     <p:spTree>
@@ -6698,7 +5663,7 @@
           <p:cNvPr id="2" name="Titel 1">
             <a:extLst>
               <a:ext uri="{FF2B5EF4-FFF2-40B4-BE49-F238E27FC236}">
-                <a16:creationId xmlns:a16="http://schemas.microsoft.com/office/drawing/2014/main" id="{4F201D36-9280-479F-A6D3-D519DC893AF8}"/>
+                <a16:creationId xmlns:a16="http://schemas.microsoft.com/office/drawing/2014/main" xmlns="" id="{4F201D36-9280-479F-A6D3-D519DC893AF8}"/>
               </a:ext>
             </a:extLst>
           </p:cNvPr>
@@ -6736,7 +5701,7 @@
           <p:cNvPr id="4" name="Grafik 3" descr="Ein Bild, das Parkplatz enthält.&#10;&#10;Automatisch generierte Beschreibung">
             <a:extLst>
               <a:ext uri="{FF2B5EF4-FFF2-40B4-BE49-F238E27FC236}">
-                <a16:creationId xmlns:a16="http://schemas.microsoft.com/office/drawing/2014/main" id="{F5B7ED90-5287-43AA-AE5F-3A672E95D177}"/>
+                <a16:creationId xmlns:a16="http://schemas.microsoft.com/office/drawing/2014/main" xmlns="" id="{F5B7ED90-5287-43AA-AE5F-3A672E95D177}"/>
               </a:ext>
             </a:extLst>
           </p:cNvPr>
@@ -6771,10 +5736,17 @@
   <p:clrMapOvr>
     <a:masterClrMapping/>
   </p:clrMapOvr>
+  <p:timing>
+    <p:tnLst>
+      <p:par>
+        <p:cTn id="1" dur="indefinite" restart="never" nodeType="tmRoot"/>
+      </p:par>
+    </p:tnLst>
+  </p:timing>
 </p:sld>
 </file>
 
-<file path=ppt/slides/slide8.xml><?xml version="1.0" encoding="utf-8"?>
+<file path=ppt/slides/slide9.xml><?xml version="1.0" encoding="utf-8"?>
 <p:sld xmlns:a="http://schemas.openxmlformats.org/drawingml/2006/main" xmlns:r="http://schemas.openxmlformats.org/officeDocument/2006/relationships" xmlns:p="http://schemas.openxmlformats.org/presentationml/2006/main">
   <p:cSld>
     <p:spTree>
@@ -6796,7 +5768,7 @@
           <p:cNvPr id="2" name="Titel 1">
             <a:extLst>
               <a:ext uri="{FF2B5EF4-FFF2-40B4-BE49-F238E27FC236}">
-                <a16:creationId xmlns:a16="http://schemas.microsoft.com/office/drawing/2014/main" id="{60CD2517-B535-4D82-8789-A20BD068DB30}"/>
+                <a16:creationId xmlns:a16="http://schemas.microsoft.com/office/drawing/2014/main" xmlns="" id="{60CD2517-B535-4D82-8789-A20BD068DB30}"/>
               </a:ext>
             </a:extLst>
           </p:cNvPr>
@@ -6826,40 +5798,12 @@
           </a:p>
         </p:txBody>
       </p:sp>
-      <p:sp>
-        <p:nvSpPr>
-          <p:cNvPr id="3" name="Textplatzhalter 2">
-            <a:extLst>
-              <a:ext uri="{FF2B5EF4-FFF2-40B4-BE49-F238E27FC236}">
-                <a16:creationId xmlns:a16="http://schemas.microsoft.com/office/drawing/2014/main" id="{A21DDEF0-926C-4269-927F-ECAACEAB9AF0}"/>
-              </a:ext>
-            </a:extLst>
-          </p:cNvPr>
-          <p:cNvSpPr>
-            <a:spLocks noGrp="1"/>
-          </p:cNvSpPr>
-          <p:nvPr>
-            <p:ph type="body" idx="1"/>
-          </p:nvPr>
-        </p:nvSpPr>
-        <p:spPr/>
-        <p:txBody>
-          <a:bodyPr/>
-          <a:lstStyle/>
-          <a:p>
-            <a:pPr marL="114300" indent="0">
-              <a:buNone/>
-            </a:pPr>
-            <a:endParaRPr lang="de-DE" dirty="0"/>
-          </a:p>
-        </p:txBody>
-      </p:sp>
       <p:pic>
         <p:nvPicPr>
           <p:cNvPr id="5" name="Grafik 4">
             <a:extLst>
               <a:ext uri="{FF2B5EF4-FFF2-40B4-BE49-F238E27FC236}">
-                <a16:creationId xmlns:a16="http://schemas.microsoft.com/office/drawing/2014/main" id="{94CD5B8C-355B-4A1E-98E0-4EB61ED93890}"/>
+                <a16:creationId xmlns:a16="http://schemas.microsoft.com/office/drawing/2014/main" xmlns="" id="{94CD5B8C-355B-4A1E-98E0-4EB61ED93890}"/>
               </a:ext>
             </a:extLst>
           </p:cNvPr>
@@ -6888,7 +5832,7 @@
           <p:cNvPr id="7" name="Grafik 6">
             <a:extLst>
               <a:ext uri="{FF2B5EF4-FFF2-40B4-BE49-F238E27FC236}">
-                <a16:creationId xmlns:a16="http://schemas.microsoft.com/office/drawing/2014/main" id="{63DE3946-3B27-4472-A919-366E9C9FC652}"/>
+                <a16:creationId xmlns:a16="http://schemas.microsoft.com/office/drawing/2014/main" xmlns="" id="{63DE3946-3B27-4472-A919-366E9C9FC652}"/>
               </a:ext>
             </a:extLst>
           </p:cNvPr>
@@ -6922,6 +5866,13 @@
   <p:clrMapOvr>
     <a:masterClrMapping/>
   </p:clrMapOvr>
+  <p:timing>
+    <p:tnLst>
+      <p:par>
+        <p:cTn id="1" dur="indefinite" restart="never" nodeType="tmRoot"/>
+      </p:par>
+    </p:tnLst>
+  </p:timing>
 </p:sld>
 </file>
 

</xml_diff>